<commit_message>
commit) ProxyPattern V2까지 적용
</commit_message>
<xml_diff>
--- a/SpringFramework/SpringAdvanced/DesignPattern.pptx
+++ b/SpringFramework/SpringAdvanced/DesignPattern.pptx
@@ -12,7 +12,8 @@
     <p:sldId id="263" r:id="rId6"/>
     <p:sldId id="265" r:id="rId7"/>
     <p:sldId id="266" r:id="rId8"/>
-    <p:sldId id="264" r:id="rId9"/>
+    <p:sldId id="267" r:id="rId9"/>
+    <p:sldId id="264" r:id="rId10"/>
   </p:sldIdLst>
   <p:sldSz cx="12192000" cy="6858000"/>
   <p:notesSz cx="6858000" cy="9144000"/>
@@ -250,7 +251,7 @@
           <a:p>
             <a:fld id="{D0C6D362-A35B-4A58-8D6B-A38C5E0DEA58}" type="datetimeFigureOut">
               <a:rPr lang="ko-KR" altLang="en-US" smtClean="0"/>
-              <a:t>2023-05-31</a:t>
+              <a:t>2023-06-01</a:t>
             </a:fld>
             <a:endParaRPr lang="ko-KR" altLang="en-US"/>
           </a:p>
@@ -420,7 +421,7 @@
           <a:p>
             <a:fld id="{D0C6D362-A35B-4A58-8D6B-A38C5E0DEA58}" type="datetimeFigureOut">
               <a:rPr lang="ko-KR" altLang="en-US" smtClean="0"/>
-              <a:t>2023-05-31</a:t>
+              <a:t>2023-06-01</a:t>
             </a:fld>
             <a:endParaRPr lang="ko-KR" altLang="en-US"/>
           </a:p>
@@ -600,7 +601,7 @@
           <a:p>
             <a:fld id="{D0C6D362-A35B-4A58-8D6B-A38C5E0DEA58}" type="datetimeFigureOut">
               <a:rPr lang="ko-KR" altLang="en-US" smtClean="0"/>
-              <a:t>2023-05-31</a:t>
+              <a:t>2023-06-01</a:t>
             </a:fld>
             <a:endParaRPr lang="ko-KR" altLang="en-US"/>
           </a:p>
@@ -770,7 +771,7 @@
           <a:p>
             <a:fld id="{D0C6D362-A35B-4A58-8D6B-A38C5E0DEA58}" type="datetimeFigureOut">
               <a:rPr lang="ko-KR" altLang="en-US" smtClean="0"/>
-              <a:t>2023-05-31</a:t>
+              <a:t>2023-06-01</a:t>
             </a:fld>
             <a:endParaRPr lang="ko-KR" altLang="en-US"/>
           </a:p>
@@ -1016,7 +1017,7 @@
           <a:p>
             <a:fld id="{D0C6D362-A35B-4A58-8D6B-A38C5E0DEA58}" type="datetimeFigureOut">
               <a:rPr lang="ko-KR" altLang="en-US" smtClean="0"/>
-              <a:t>2023-05-31</a:t>
+              <a:t>2023-06-01</a:t>
             </a:fld>
             <a:endParaRPr lang="ko-KR" altLang="en-US"/>
           </a:p>
@@ -1248,7 +1249,7 @@
           <a:p>
             <a:fld id="{D0C6D362-A35B-4A58-8D6B-A38C5E0DEA58}" type="datetimeFigureOut">
               <a:rPr lang="ko-KR" altLang="en-US" smtClean="0"/>
-              <a:t>2023-05-31</a:t>
+              <a:t>2023-06-01</a:t>
             </a:fld>
             <a:endParaRPr lang="ko-KR" altLang="en-US"/>
           </a:p>
@@ -1615,7 +1616,7 @@
           <a:p>
             <a:fld id="{D0C6D362-A35B-4A58-8D6B-A38C5E0DEA58}" type="datetimeFigureOut">
               <a:rPr lang="ko-KR" altLang="en-US" smtClean="0"/>
-              <a:t>2023-05-31</a:t>
+              <a:t>2023-06-01</a:t>
             </a:fld>
             <a:endParaRPr lang="ko-KR" altLang="en-US"/>
           </a:p>
@@ -1733,7 +1734,7 @@
           <a:p>
             <a:fld id="{D0C6D362-A35B-4A58-8D6B-A38C5E0DEA58}" type="datetimeFigureOut">
               <a:rPr lang="ko-KR" altLang="en-US" smtClean="0"/>
-              <a:t>2023-05-31</a:t>
+              <a:t>2023-06-01</a:t>
             </a:fld>
             <a:endParaRPr lang="ko-KR" altLang="en-US"/>
           </a:p>
@@ -1828,7 +1829,7 @@
           <a:p>
             <a:fld id="{D0C6D362-A35B-4A58-8D6B-A38C5E0DEA58}" type="datetimeFigureOut">
               <a:rPr lang="ko-KR" altLang="en-US" smtClean="0"/>
-              <a:t>2023-05-31</a:t>
+              <a:t>2023-06-01</a:t>
             </a:fld>
             <a:endParaRPr lang="ko-KR" altLang="en-US"/>
           </a:p>
@@ -2105,7 +2106,7 @@
           <a:p>
             <a:fld id="{D0C6D362-A35B-4A58-8D6B-A38C5E0DEA58}" type="datetimeFigureOut">
               <a:rPr lang="ko-KR" altLang="en-US" smtClean="0"/>
-              <a:t>2023-05-31</a:t>
+              <a:t>2023-06-01</a:t>
             </a:fld>
             <a:endParaRPr lang="ko-KR" altLang="en-US"/>
           </a:p>
@@ -2358,7 +2359,7 @@
           <a:p>
             <a:fld id="{D0C6D362-A35B-4A58-8D6B-A38C5E0DEA58}" type="datetimeFigureOut">
               <a:rPr lang="ko-KR" altLang="en-US" smtClean="0"/>
-              <a:t>2023-05-31</a:t>
+              <a:t>2023-06-01</a:t>
             </a:fld>
             <a:endParaRPr lang="ko-KR" altLang="en-US"/>
           </a:p>
@@ -2571,7 +2572,7 @@
           <a:p>
             <a:fld id="{D0C6D362-A35B-4A58-8D6B-A38C5E0DEA58}" type="datetimeFigureOut">
               <a:rPr lang="ko-KR" altLang="en-US" smtClean="0"/>
-              <a:t>2023-05-31</a:t>
+              <a:t>2023-06-01</a:t>
             </a:fld>
             <a:endParaRPr lang="ko-KR" altLang="en-US"/>
           </a:p>
@@ -8616,8 +8617,8 @@
         </p:nvSpPr>
         <p:spPr>
           <a:xfrm>
-            <a:off x="274320" y="182880"/>
-            <a:ext cx="4509183" cy="338554"/>
+            <a:off x="182880" y="90062"/>
+            <a:ext cx="6126480" cy="307777"/>
           </a:xfrm>
           <a:prstGeom prst="rect">
             <a:avLst/>
@@ -8631,41 +8632,48 @@
           <a:lstStyle/>
           <a:p>
             <a:r>
-              <a:rPr lang="en-US" altLang="ko-KR" sz="1600" dirty="0" smtClean="0">
+              <a:rPr lang="en-US" altLang="ko-KR" sz="1400" dirty="0" smtClean="0">
                 <a:latin typeface="Times New Roman" panose="02020603050405020304" pitchFamily="18" charset="0"/>
                 <a:cs typeface="Times New Roman" panose="02020603050405020304" pitchFamily="18" charset="0"/>
               </a:rPr>
               <a:t>Proxy Pattern (</a:t>
             </a:r>
             <a:r>
-              <a:rPr lang="ko-KR" altLang="en-US" sz="1600" dirty="0" smtClean="0">
+              <a:rPr lang="ko-KR" altLang="en-US" sz="1400" dirty="0" smtClean="0">
                 <a:latin typeface="Times New Roman" panose="02020603050405020304" pitchFamily="18" charset="0"/>
                 <a:cs typeface="Times New Roman" panose="02020603050405020304" pitchFamily="18" charset="0"/>
               </a:rPr>
               <a:t>실제 </a:t>
             </a:r>
             <a:r>
-              <a:rPr lang="en-US" altLang="ko-KR" sz="1600" dirty="0" smtClean="0">
+              <a:rPr lang="en-US" altLang="ko-KR" sz="1400" dirty="0" smtClean="0">
                 <a:latin typeface="Times New Roman" panose="02020603050405020304" pitchFamily="18" charset="0"/>
                 <a:cs typeface="Times New Roman" panose="02020603050405020304" pitchFamily="18" charset="0"/>
               </a:rPr>
               <a:t>Runtime </a:t>
             </a:r>
             <a:r>
-              <a:rPr lang="ko-KR" altLang="en-US" sz="1600" dirty="0" err="1" smtClean="0">
+              <a:rPr lang="ko-KR" altLang="en-US" sz="1400" dirty="0" err="1" smtClean="0">
                 <a:latin typeface="Times New Roman" panose="02020603050405020304" pitchFamily="18" charset="0"/>
                 <a:cs typeface="Times New Roman" panose="02020603050405020304" pitchFamily="18" charset="0"/>
               </a:rPr>
               <a:t>동적관계</a:t>
             </a:r>
             <a:r>
-              <a:rPr lang="en-US" altLang="ko-KR" sz="1600" dirty="0" smtClean="0">
+              <a:rPr lang="en-US" altLang="ko-KR" sz="1400" dirty="0" smtClean="0">
                 <a:latin typeface="Times New Roman" panose="02020603050405020304" pitchFamily="18" charset="0"/>
                 <a:cs typeface="Times New Roman" panose="02020603050405020304" pitchFamily="18" charset="0"/>
               </a:rPr>
-              <a:t>)</a:t>
-            </a:r>
-            <a:endParaRPr lang="en-US" altLang="ko-KR" sz="1200" dirty="0" smtClean="0">
+              <a:t>) - </a:t>
+            </a:r>
+            <a:r>
+              <a:rPr lang="ko-KR" altLang="en-US" sz="1400" dirty="0" smtClean="0">
+                <a:latin typeface="Times New Roman" panose="02020603050405020304" pitchFamily="18" charset="0"/>
+                <a:cs typeface="Times New Roman" panose="02020603050405020304" pitchFamily="18" charset="0"/>
+              </a:rPr>
+              <a:t>인터페이스가 있는 곳</a:t>
+            </a:r>
+            <a:endParaRPr lang="en-US" altLang="ko-KR" sz="1100" dirty="0" smtClean="0">
               <a:latin typeface="Times New Roman" panose="02020603050405020304" pitchFamily="18" charset="0"/>
               <a:cs typeface="Times New Roman" panose="02020603050405020304" pitchFamily="18" charset="0"/>
             </a:endParaRPr>
@@ -9592,8 +9600,16 @@
             <a:p>
               <a:pPr algn="ctr"/>
               <a:r>
+                <a:rPr lang="ko-KR" altLang="en-US" sz="1200" b="1" dirty="0" smtClean="0"/>
+                <a:t>주입된 </a:t>
+              </a:r>
+              <a:r>
                 <a:rPr lang="en-US" altLang="ko-KR" sz="1200" b="1" dirty="0" smtClean="0"/>
-                <a:t>Target Logic</a:t>
+                <a:t>Target </a:t>
+              </a:r>
+              <a:r>
+                <a:rPr lang="en-US" altLang="ko-KR" sz="1200" b="1" dirty="0" smtClean="0"/>
+                <a:t>Logic</a:t>
               </a:r>
               <a:r>
                 <a:rPr lang="ko-KR" altLang="en-US" sz="1200" b="1" dirty="0" smtClean="0"/>
@@ -10078,6 +10094,1086 @@
 </file>
 
 <file path=ppt/slides/slide8.xml><?xml version="1.0" encoding="utf-8"?>
+<p:sld xmlns:a="http://schemas.openxmlformats.org/drawingml/2006/main" xmlns:r="http://schemas.openxmlformats.org/officeDocument/2006/relationships" xmlns:p="http://schemas.openxmlformats.org/presentationml/2006/main">
+  <p:cSld>
+    <p:spTree>
+      <p:nvGrpSpPr>
+        <p:cNvPr id="1" name=""/>
+        <p:cNvGrpSpPr/>
+        <p:nvPr/>
+      </p:nvGrpSpPr>
+      <p:grpSpPr>
+        <a:xfrm>
+          <a:off x="0" y="0"/>
+          <a:ext cx="0" cy="0"/>
+          <a:chOff x="0" y="0"/>
+          <a:chExt cx="0" cy="0"/>
+        </a:xfrm>
+      </p:grpSpPr>
+      <p:sp>
+        <p:nvSpPr>
+          <p:cNvPr id="2" name="TextBox 1"/>
+          <p:cNvSpPr txBox="1"/>
+          <p:nvPr/>
+        </p:nvSpPr>
+        <p:spPr>
+          <a:xfrm>
+            <a:off x="182880" y="90062"/>
+            <a:ext cx="6126480" cy="307777"/>
+          </a:xfrm>
+          <a:prstGeom prst="rect">
+            <a:avLst/>
+          </a:prstGeom>
+          <a:noFill/>
+        </p:spPr>
+        <p:txBody>
+          <a:bodyPr wrap="square" rtlCol="0">
+            <a:spAutoFit/>
+          </a:bodyPr>
+          <a:lstStyle/>
+          <a:p>
+            <a:r>
+              <a:rPr lang="en-US" altLang="ko-KR" sz="1400" dirty="0" smtClean="0">
+                <a:latin typeface="Times New Roman" panose="02020603050405020304" pitchFamily="18" charset="0"/>
+                <a:cs typeface="Times New Roman" panose="02020603050405020304" pitchFamily="18" charset="0"/>
+              </a:rPr>
+              <a:t>Proxy Pattern (</a:t>
+            </a:r>
+            <a:r>
+              <a:rPr lang="ko-KR" altLang="en-US" sz="1400" dirty="0" smtClean="0">
+                <a:latin typeface="Times New Roman" panose="02020603050405020304" pitchFamily="18" charset="0"/>
+                <a:cs typeface="Times New Roman" panose="02020603050405020304" pitchFamily="18" charset="0"/>
+              </a:rPr>
+              <a:t>실제 </a:t>
+            </a:r>
+            <a:r>
+              <a:rPr lang="en-US" altLang="ko-KR" sz="1400" dirty="0" smtClean="0">
+                <a:latin typeface="Times New Roman" panose="02020603050405020304" pitchFamily="18" charset="0"/>
+                <a:cs typeface="Times New Roman" panose="02020603050405020304" pitchFamily="18" charset="0"/>
+              </a:rPr>
+              <a:t>Runtime </a:t>
+            </a:r>
+            <a:r>
+              <a:rPr lang="ko-KR" altLang="en-US" sz="1400" dirty="0" err="1" smtClean="0">
+                <a:latin typeface="Times New Roman" panose="02020603050405020304" pitchFamily="18" charset="0"/>
+                <a:cs typeface="Times New Roman" panose="02020603050405020304" pitchFamily="18" charset="0"/>
+              </a:rPr>
+              <a:t>동적관계</a:t>
+            </a:r>
+            <a:r>
+              <a:rPr lang="en-US" altLang="ko-KR" sz="1400" dirty="0" smtClean="0">
+                <a:latin typeface="Times New Roman" panose="02020603050405020304" pitchFamily="18" charset="0"/>
+                <a:cs typeface="Times New Roman" panose="02020603050405020304" pitchFamily="18" charset="0"/>
+              </a:rPr>
+              <a:t>) – </a:t>
+            </a:r>
+            <a:r>
+              <a:rPr lang="ko-KR" altLang="en-US" sz="1400" dirty="0" smtClean="0">
+                <a:latin typeface="Times New Roman" panose="02020603050405020304" pitchFamily="18" charset="0"/>
+                <a:cs typeface="Times New Roman" panose="02020603050405020304" pitchFamily="18" charset="0"/>
+              </a:rPr>
+              <a:t>구체 클래스만 있는 곳</a:t>
+            </a:r>
+            <a:endParaRPr lang="en-US" altLang="ko-KR" sz="1100" dirty="0" smtClean="0">
+              <a:latin typeface="Times New Roman" panose="02020603050405020304" pitchFamily="18" charset="0"/>
+              <a:cs typeface="Times New Roman" panose="02020603050405020304" pitchFamily="18" charset="0"/>
+            </a:endParaRPr>
+          </a:p>
+        </p:txBody>
+      </p:sp>
+      <p:grpSp>
+        <p:nvGrpSpPr>
+          <p:cNvPr id="24" name="그룹 23"/>
+          <p:cNvGrpSpPr/>
+          <p:nvPr/>
+        </p:nvGrpSpPr>
+        <p:grpSpPr>
+          <a:xfrm>
+            <a:off x="590205" y="552045"/>
+            <a:ext cx="10666610" cy="5912784"/>
+            <a:chOff x="590205" y="552045"/>
+            <a:chExt cx="10666610" cy="5912784"/>
+          </a:xfrm>
+        </p:grpSpPr>
+        <p:sp>
+          <p:nvSpPr>
+            <p:cNvPr id="42" name="직사각형 41"/>
+            <p:cNvSpPr/>
+            <p:nvPr/>
+          </p:nvSpPr>
+          <p:spPr>
+            <a:xfrm>
+              <a:off x="5203768" y="1890559"/>
+              <a:ext cx="2593571" cy="3840482"/>
+            </a:xfrm>
+            <a:prstGeom prst="rect">
+              <a:avLst/>
+            </a:prstGeom>
+            <a:gradFill flip="none" rotWithShape="1">
+              <a:gsLst>
+                <a:gs pos="0">
+                  <a:schemeClr val="accent1">
+                    <a:tint val="66000"/>
+                    <a:satMod val="160000"/>
+                  </a:schemeClr>
+                </a:gs>
+                <a:gs pos="50000">
+                  <a:schemeClr val="accent1">
+                    <a:tint val="44500"/>
+                    <a:satMod val="160000"/>
+                  </a:schemeClr>
+                </a:gs>
+                <a:gs pos="100000">
+                  <a:schemeClr val="accent1">
+                    <a:tint val="23500"/>
+                    <a:satMod val="160000"/>
+                  </a:schemeClr>
+                </a:gs>
+              </a:gsLst>
+              <a:lin ang="5400000" scaled="1"/>
+              <a:tileRect/>
+            </a:gradFill>
+            <a:ln>
+              <a:solidFill>
+                <a:schemeClr val="tx1"/>
+              </a:solidFill>
+            </a:ln>
+          </p:spPr>
+          <p:style>
+            <a:lnRef idx="2">
+              <a:schemeClr val="accent1">
+                <a:shade val="50000"/>
+              </a:schemeClr>
+            </a:lnRef>
+            <a:fillRef idx="1">
+              <a:schemeClr val="accent1"/>
+            </a:fillRef>
+            <a:effectRef idx="0">
+              <a:schemeClr val="accent1"/>
+            </a:effectRef>
+            <a:fontRef idx="minor">
+              <a:schemeClr val="lt1"/>
+            </a:fontRef>
+          </p:style>
+          <p:txBody>
+            <a:bodyPr rtlCol="0" anchor="ctr"/>
+            <a:lstStyle/>
+            <a:p>
+              <a:pPr algn="ctr"/>
+              <a:endParaRPr lang="ko-KR" altLang="en-US"/>
+            </a:p>
+          </p:txBody>
+        </p:sp>
+        <p:sp>
+          <p:nvSpPr>
+            <p:cNvPr id="3" name="모서리가 둥근 직사각형 2"/>
+            <p:cNvSpPr/>
+            <p:nvPr/>
+          </p:nvSpPr>
+          <p:spPr>
+            <a:xfrm>
+              <a:off x="590205" y="1890561"/>
+              <a:ext cx="2576946" cy="2261061"/>
+            </a:xfrm>
+            <a:prstGeom prst="roundRect">
+              <a:avLst/>
+            </a:prstGeom>
+            <a:noFill/>
+            <a:ln>
+              <a:solidFill>
+                <a:schemeClr val="tx1"/>
+              </a:solidFill>
+            </a:ln>
+          </p:spPr>
+          <p:style>
+            <a:lnRef idx="2">
+              <a:schemeClr val="accent1">
+                <a:shade val="50000"/>
+              </a:schemeClr>
+            </a:lnRef>
+            <a:fillRef idx="1">
+              <a:schemeClr val="accent1"/>
+            </a:fillRef>
+            <a:effectRef idx="0">
+              <a:schemeClr val="accent1"/>
+            </a:effectRef>
+            <a:fontRef idx="minor">
+              <a:schemeClr val="lt1"/>
+            </a:fontRef>
+          </p:style>
+          <p:txBody>
+            <a:bodyPr rtlCol="0" anchor="ctr"/>
+            <a:lstStyle/>
+            <a:p>
+              <a:pPr algn="ctr"/>
+              <a:endParaRPr lang="ko-KR" altLang="en-US" dirty="0">
+                <a:solidFill>
+                  <a:schemeClr val="tx1"/>
+                </a:solidFill>
+              </a:endParaRPr>
+            </a:p>
+          </p:txBody>
+        </p:sp>
+        <p:sp>
+          <p:nvSpPr>
+            <p:cNvPr id="32" name="모서리가 둥근 직사각형 31"/>
+            <p:cNvSpPr/>
+            <p:nvPr/>
+          </p:nvSpPr>
+          <p:spPr>
+            <a:xfrm>
+              <a:off x="4857403" y="721489"/>
+              <a:ext cx="3230879" cy="5743340"/>
+            </a:xfrm>
+            <a:prstGeom prst="roundRect">
+              <a:avLst/>
+            </a:prstGeom>
+            <a:noFill/>
+            <a:ln>
+              <a:solidFill>
+                <a:schemeClr val="tx1"/>
+              </a:solidFill>
+            </a:ln>
+          </p:spPr>
+          <p:style>
+            <a:lnRef idx="2">
+              <a:schemeClr val="accent1">
+                <a:shade val="50000"/>
+              </a:schemeClr>
+            </a:lnRef>
+            <a:fillRef idx="1">
+              <a:schemeClr val="accent1"/>
+            </a:fillRef>
+            <a:effectRef idx="0">
+              <a:schemeClr val="accent1"/>
+            </a:effectRef>
+            <a:fontRef idx="minor">
+              <a:schemeClr val="lt1"/>
+            </a:fontRef>
+          </p:style>
+          <p:txBody>
+            <a:bodyPr rtlCol="0" anchor="ctr"/>
+            <a:lstStyle/>
+            <a:p>
+              <a:pPr algn="ctr"/>
+              <a:endParaRPr lang="ko-KR" altLang="en-US" dirty="0">
+                <a:solidFill>
+                  <a:schemeClr val="tx1"/>
+                </a:solidFill>
+              </a:endParaRPr>
+            </a:p>
+          </p:txBody>
+        </p:sp>
+        <p:sp>
+          <p:nvSpPr>
+            <p:cNvPr id="34" name="모서리가 둥근 직사각형 33"/>
+            <p:cNvSpPr/>
+            <p:nvPr/>
+          </p:nvSpPr>
+          <p:spPr>
+            <a:xfrm>
+              <a:off x="8679869" y="1211686"/>
+              <a:ext cx="2576946" cy="3496890"/>
+            </a:xfrm>
+            <a:prstGeom prst="roundRect">
+              <a:avLst/>
+            </a:prstGeom>
+            <a:noFill/>
+            <a:ln>
+              <a:solidFill>
+                <a:schemeClr val="tx1"/>
+              </a:solidFill>
+            </a:ln>
+          </p:spPr>
+          <p:style>
+            <a:lnRef idx="2">
+              <a:schemeClr val="accent1">
+                <a:shade val="50000"/>
+              </a:schemeClr>
+            </a:lnRef>
+            <a:fillRef idx="1">
+              <a:schemeClr val="accent1"/>
+            </a:fillRef>
+            <a:effectRef idx="0">
+              <a:schemeClr val="accent1"/>
+            </a:effectRef>
+            <a:fontRef idx="minor">
+              <a:schemeClr val="lt1"/>
+            </a:fontRef>
+          </p:style>
+          <p:txBody>
+            <a:bodyPr rtlCol="0" anchor="ctr"/>
+            <a:lstStyle/>
+            <a:p>
+              <a:pPr algn="ctr"/>
+              <a:endParaRPr lang="ko-KR" altLang="en-US" dirty="0">
+                <a:solidFill>
+                  <a:schemeClr val="tx1"/>
+                </a:solidFill>
+              </a:endParaRPr>
+            </a:p>
+          </p:txBody>
+        </p:sp>
+        <p:sp>
+          <p:nvSpPr>
+            <p:cNvPr id="37" name="모서리가 둥근 직사각형 36"/>
+            <p:cNvSpPr/>
+            <p:nvPr/>
+          </p:nvSpPr>
+          <p:spPr>
+            <a:xfrm>
+              <a:off x="880344" y="2787326"/>
+              <a:ext cx="2047703" cy="729047"/>
+            </a:xfrm>
+            <a:prstGeom prst="roundRect">
+              <a:avLst/>
+            </a:prstGeom>
+            <a:noFill/>
+            <a:ln>
+              <a:solidFill>
+                <a:schemeClr val="tx1"/>
+              </a:solidFill>
+            </a:ln>
+          </p:spPr>
+          <p:style>
+            <a:lnRef idx="2">
+              <a:schemeClr val="accent1">
+                <a:shade val="50000"/>
+              </a:schemeClr>
+            </a:lnRef>
+            <a:fillRef idx="1">
+              <a:schemeClr val="accent1"/>
+            </a:fillRef>
+            <a:effectRef idx="0">
+              <a:schemeClr val="accent1"/>
+            </a:effectRef>
+            <a:fontRef idx="minor">
+              <a:schemeClr val="lt1"/>
+            </a:fontRef>
+          </p:style>
+          <p:txBody>
+            <a:bodyPr rtlCol="0" anchor="ctr"/>
+            <a:lstStyle/>
+            <a:p>
+              <a:pPr algn="ctr"/>
+              <a:r>
+                <a:rPr lang="en-US" altLang="ko-KR" sz="1400" dirty="0" smtClean="0">
+                  <a:solidFill>
+                    <a:schemeClr val="tx1"/>
+                  </a:solidFill>
+                </a:rPr>
+                <a:t>Implementation</a:t>
+              </a:r>
+              <a:endParaRPr lang="en-US" altLang="ko-KR" sz="1400" dirty="0" smtClean="0">
+                <a:solidFill>
+                  <a:schemeClr val="tx1"/>
+                </a:solidFill>
+              </a:endParaRPr>
+            </a:p>
+          </p:txBody>
+        </p:sp>
+        <p:sp>
+          <p:nvSpPr>
+            <p:cNvPr id="19" name="직사각형 18"/>
+            <p:cNvSpPr/>
+            <p:nvPr/>
+          </p:nvSpPr>
+          <p:spPr>
+            <a:xfrm>
+              <a:off x="5246715" y="552045"/>
+              <a:ext cx="2452254" cy="307777"/>
+            </a:xfrm>
+            <a:prstGeom prst="rect">
+              <a:avLst/>
+            </a:prstGeom>
+            <a:solidFill>
+              <a:schemeClr val="bg1"/>
+            </a:solidFill>
+            <a:ln>
+              <a:solidFill>
+                <a:schemeClr val="tx1"/>
+              </a:solidFill>
+            </a:ln>
+          </p:spPr>
+          <p:txBody>
+            <a:bodyPr wrap="square">
+              <a:spAutoFit/>
+            </a:bodyPr>
+            <a:lstStyle/>
+            <a:p>
+              <a:pPr algn="ctr"/>
+              <a:r>
+                <a:rPr lang="en-US" altLang="ko-KR" sz="1400" dirty="0" smtClean="0"/>
+                <a:t>Proxy </a:t>
+              </a:r>
+              <a:r>
+                <a:rPr lang="en-US" altLang="ko-KR" sz="1400" dirty="0" smtClean="0">
+                  <a:solidFill>
+                    <a:schemeClr val="accent5"/>
+                  </a:solidFill>
+                </a:rPr>
+                <a:t>extends</a:t>
+              </a:r>
+              <a:r>
+                <a:rPr lang="en-US" altLang="ko-KR" sz="1400" dirty="0" smtClean="0"/>
+                <a:t> </a:t>
+              </a:r>
+              <a:r>
+                <a:rPr lang="en-US" altLang="ko-KR" sz="1400" dirty="0" err="1" smtClean="0"/>
+                <a:t>RealSubject</a:t>
+              </a:r>
+              <a:endParaRPr lang="ko-KR" altLang="en-US" sz="1400" dirty="0"/>
+            </a:p>
+          </p:txBody>
+        </p:sp>
+        <p:sp>
+          <p:nvSpPr>
+            <p:cNvPr id="20" name="직사각형 19"/>
+            <p:cNvSpPr/>
+            <p:nvPr/>
+          </p:nvSpPr>
+          <p:spPr>
+            <a:xfrm>
+              <a:off x="854827" y="1705893"/>
+              <a:ext cx="779380" cy="369332"/>
+            </a:xfrm>
+            <a:prstGeom prst="rect">
+              <a:avLst/>
+            </a:prstGeom>
+            <a:solidFill>
+              <a:schemeClr val="bg1"/>
+            </a:solidFill>
+            <a:ln>
+              <a:solidFill>
+                <a:schemeClr val="tx1"/>
+              </a:solidFill>
+            </a:ln>
+          </p:spPr>
+          <p:txBody>
+            <a:bodyPr wrap="none">
+              <a:spAutoFit/>
+            </a:bodyPr>
+            <a:lstStyle/>
+            <a:p>
+              <a:pPr algn="ctr"/>
+              <a:r>
+                <a:rPr lang="en-US" altLang="ko-KR" dirty="0"/>
+                <a:t>Client</a:t>
+              </a:r>
+              <a:endParaRPr lang="ko-KR" altLang="en-US" dirty="0"/>
+            </a:p>
+          </p:txBody>
+        </p:sp>
+        <p:sp>
+          <p:nvSpPr>
+            <p:cNvPr id="31" name="TextBox 30"/>
+            <p:cNvSpPr txBox="1"/>
+            <p:nvPr/>
+          </p:nvSpPr>
+          <p:spPr>
+            <a:xfrm>
+              <a:off x="901929" y="2194902"/>
+              <a:ext cx="2021382" cy="461665"/>
+            </a:xfrm>
+            <a:prstGeom prst="rect">
+              <a:avLst/>
+            </a:prstGeom>
+            <a:noFill/>
+          </p:spPr>
+          <p:txBody>
+            <a:bodyPr wrap="square" rtlCol="0">
+              <a:spAutoFit/>
+            </a:bodyPr>
+            <a:lstStyle/>
+            <a:p>
+              <a:r>
+                <a:rPr lang="en-US" altLang="ko-KR" sz="1200" dirty="0" smtClean="0">
+                  <a:solidFill>
+                    <a:srgbClr val="FF0000"/>
+                  </a:solidFill>
+                </a:rPr>
+                <a:t>Injection </a:t>
+              </a:r>
+            </a:p>
+            <a:p>
+              <a:r>
+                <a:rPr lang="en-US" altLang="ko-KR" sz="1200" dirty="0" smtClean="0">
+                  <a:solidFill>
+                    <a:srgbClr val="FF0000"/>
+                  </a:solidFill>
+                </a:rPr>
+                <a:t>(</a:t>
+              </a:r>
+              <a:r>
+                <a:rPr lang="en-US" altLang="ko-KR" sz="1200" b="1" dirty="0" err="1" smtClean="0"/>
+                <a:t>RealSubject</a:t>
+              </a:r>
+              <a:r>
+                <a:rPr lang="en-US" altLang="ko-KR" sz="1200" b="1" dirty="0" smtClean="0"/>
+                <a:t> </a:t>
+              </a:r>
+              <a:r>
+                <a:rPr lang="en-US" altLang="ko-KR" sz="1200" b="1" dirty="0" err="1" smtClean="0"/>
+                <a:t>realSubject</a:t>
+              </a:r>
+              <a:r>
+                <a:rPr lang="en-US" altLang="ko-KR" sz="1200" dirty="0" smtClean="0">
+                  <a:solidFill>
+                    <a:srgbClr val="FF0000"/>
+                  </a:solidFill>
+                </a:rPr>
+                <a:t>)</a:t>
+              </a:r>
+              <a:endParaRPr lang="ko-KR" altLang="en-US" sz="1200" dirty="0">
+                <a:solidFill>
+                  <a:srgbClr val="FF0000"/>
+                </a:solidFill>
+              </a:endParaRPr>
+            </a:p>
+          </p:txBody>
+        </p:sp>
+        <p:sp>
+          <p:nvSpPr>
+            <p:cNvPr id="22" name="직사각형 21"/>
+            <p:cNvSpPr/>
+            <p:nvPr/>
+          </p:nvSpPr>
+          <p:spPr>
+            <a:xfrm>
+              <a:off x="9012155" y="966062"/>
+              <a:ext cx="1383136" cy="369332"/>
+            </a:xfrm>
+            <a:prstGeom prst="rect">
+              <a:avLst/>
+            </a:prstGeom>
+            <a:solidFill>
+              <a:schemeClr val="bg1"/>
+            </a:solidFill>
+            <a:ln>
+              <a:solidFill>
+                <a:schemeClr val="tx1"/>
+              </a:solidFill>
+            </a:ln>
+          </p:spPr>
+          <p:txBody>
+            <a:bodyPr wrap="none">
+              <a:spAutoFit/>
+            </a:bodyPr>
+            <a:lstStyle/>
+            <a:p>
+              <a:pPr algn="ctr"/>
+              <a:r>
+                <a:rPr lang="en-US" altLang="ko-KR" dirty="0" err="1"/>
+                <a:t>RealSubject</a:t>
+              </a:r>
+              <a:endParaRPr lang="ko-KR" altLang="en-US" dirty="0"/>
+            </a:p>
+          </p:txBody>
+        </p:sp>
+        <p:sp>
+          <p:nvSpPr>
+            <p:cNvPr id="44" name="TextBox 43"/>
+            <p:cNvSpPr txBox="1"/>
+            <p:nvPr/>
+          </p:nvSpPr>
+          <p:spPr>
+            <a:xfrm>
+              <a:off x="9086970" y="1631969"/>
+              <a:ext cx="1066798" cy="276999"/>
+            </a:xfrm>
+            <a:prstGeom prst="rect">
+              <a:avLst/>
+            </a:prstGeom>
+            <a:noFill/>
+          </p:spPr>
+          <p:txBody>
+            <a:bodyPr wrap="square" rtlCol="0">
+              <a:spAutoFit/>
+            </a:bodyPr>
+            <a:lstStyle/>
+            <a:p>
+              <a:r>
+                <a:rPr lang="en-US" altLang="ko-KR" sz="1200" b="1" dirty="0" smtClean="0"/>
+                <a:t>operations()</a:t>
+              </a:r>
+              <a:endParaRPr lang="ko-KR" altLang="en-US" sz="1200" b="1" dirty="0">
+                <a:solidFill>
+                  <a:srgbClr val="FF0000"/>
+                </a:solidFill>
+              </a:endParaRPr>
+            </a:p>
+          </p:txBody>
+        </p:sp>
+        <p:sp>
+          <p:nvSpPr>
+            <p:cNvPr id="28" name="TextBox 27"/>
+            <p:cNvSpPr txBox="1"/>
+            <p:nvPr/>
+          </p:nvSpPr>
+          <p:spPr>
+            <a:xfrm>
+              <a:off x="9220196" y="2015042"/>
+              <a:ext cx="1727665" cy="276999"/>
+            </a:xfrm>
+            <a:prstGeom prst="rect">
+              <a:avLst/>
+            </a:prstGeom>
+            <a:noFill/>
+          </p:spPr>
+          <p:txBody>
+            <a:bodyPr wrap="square" rtlCol="0">
+              <a:spAutoFit/>
+            </a:bodyPr>
+            <a:lstStyle/>
+            <a:p>
+              <a:pPr algn="ctr"/>
+              <a:r>
+                <a:rPr lang="ko-KR" altLang="en-US" sz="1200" b="1" smtClean="0"/>
+                <a:t>구현되어 있는 </a:t>
+              </a:r>
+              <a:r>
+                <a:rPr lang="ko-KR" altLang="en-US" sz="1200" b="1" dirty="0" err="1" smtClean="0"/>
+                <a:t>로직</a:t>
+              </a:r>
+              <a:endParaRPr lang="ko-KR" altLang="en-US" sz="1200" b="1" dirty="0"/>
+            </a:p>
+          </p:txBody>
+        </p:sp>
+        <p:sp>
+          <p:nvSpPr>
+            <p:cNvPr id="36" name="직사각형 35"/>
+            <p:cNvSpPr/>
+            <p:nvPr/>
+          </p:nvSpPr>
+          <p:spPr>
+            <a:xfrm>
+              <a:off x="1155717" y="3590222"/>
+              <a:ext cx="1436553" cy="276999"/>
+            </a:xfrm>
+            <a:prstGeom prst="rect">
+              <a:avLst/>
+            </a:prstGeom>
+            <a:solidFill>
+              <a:schemeClr val="bg1"/>
+            </a:solidFill>
+            <a:ln>
+              <a:noFill/>
+            </a:ln>
+          </p:spPr>
+          <p:txBody>
+            <a:bodyPr wrap="square">
+              <a:spAutoFit/>
+            </a:bodyPr>
+            <a:lstStyle/>
+            <a:p>
+              <a:pPr algn="ctr"/>
+              <a:r>
+                <a:rPr lang="en-US" altLang="ko-KR" sz="1200" dirty="0" smtClean="0"/>
+                <a:t>Proxy (</a:t>
+              </a:r>
+              <a:r>
+                <a:rPr lang="ko-KR" altLang="en-US" sz="1200" dirty="0" smtClean="0"/>
+                <a:t>객체 주입</a:t>
+              </a:r>
+              <a:r>
+                <a:rPr lang="en-US" altLang="ko-KR" sz="1200" dirty="0" smtClean="0"/>
+                <a:t>)</a:t>
+              </a:r>
+              <a:endParaRPr lang="ko-KR" altLang="en-US" sz="1200" dirty="0"/>
+            </a:p>
+          </p:txBody>
+        </p:sp>
+        <p:sp>
+          <p:nvSpPr>
+            <p:cNvPr id="4" name="TextBox 3"/>
+            <p:cNvSpPr txBox="1"/>
+            <p:nvPr/>
+          </p:nvSpPr>
+          <p:spPr>
+            <a:xfrm>
+              <a:off x="4921135" y="1068627"/>
+              <a:ext cx="3167147" cy="646331"/>
+            </a:xfrm>
+            <a:prstGeom prst="rect">
+              <a:avLst/>
+            </a:prstGeom>
+            <a:noFill/>
+          </p:spPr>
+          <p:txBody>
+            <a:bodyPr wrap="square" rtlCol="0">
+              <a:spAutoFit/>
+            </a:bodyPr>
+            <a:lstStyle/>
+            <a:p>
+              <a:r>
+                <a:rPr lang="en-US" altLang="ko-KR" sz="1200" b="1" dirty="0" smtClean="0"/>
+                <a:t>* Proxy</a:t>
+              </a:r>
+              <a:r>
+                <a:rPr lang="ko-KR" altLang="en-US" sz="1200" b="1" dirty="0" smtClean="0"/>
+                <a:t>객체는 </a:t>
+              </a:r>
+              <a:r>
+                <a:rPr lang="en-US" altLang="ko-KR" sz="1200" b="1" dirty="0" err="1" smtClean="0"/>
+                <a:t>RealSubject</a:t>
+              </a:r>
+              <a:r>
+                <a:rPr lang="ko-KR" altLang="en-US" sz="1200" b="1" dirty="0" smtClean="0"/>
+                <a:t>를 상속받아 </a:t>
+              </a:r>
+              <a:r>
+                <a:rPr lang="ko-KR" altLang="en-US" sz="1200" b="1" dirty="0" err="1" smtClean="0"/>
+                <a:t>부모객체가</a:t>
+              </a:r>
+              <a:r>
+                <a:rPr lang="ko-KR" altLang="en-US" sz="1200" b="1" dirty="0" smtClean="0"/>
+                <a:t> </a:t>
+              </a:r>
+              <a:r>
+                <a:rPr lang="en-US" altLang="ko-KR" sz="1200" b="1" dirty="0" err="1" smtClean="0"/>
+                <a:t>RealSubject</a:t>
+              </a:r>
+              <a:r>
+                <a:rPr lang="ko-KR" altLang="en-US" sz="1200" b="1" dirty="0" smtClean="0"/>
+                <a:t>가 됨으로써 </a:t>
+              </a:r>
+              <a:r>
+                <a:rPr lang="en-US" altLang="ko-KR" sz="1200" b="1" dirty="0" smtClean="0"/>
+                <a:t>Client</a:t>
+              </a:r>
+              <a:r>
+                <a:rPr lang="ko-KR" altLang="en-US" sz="1200" b="1" dirty="0" smtClean="0"/>
+                <a:t>에 </a:t>
+              </a:r>
+              <a:r>
+                <a:rPr lang="ko-KR" altLang="en-US" sz="1200" b="1" dirty="0" err="1" smtClean="0"/>
+                <a:t>주입할수</a:t>
+              </a:r>
+              <a:r>
+                <a:rPr lang="ko-KR" altLang="en-US" sz="1200" b="1" dirty="0" smtClean="0"/>
+                <a:t> 있게 된다 </a:t>
+              </a:r>
+              <a:r>
+                <a:rPr lang="en-US" altLang="ko-KR" sz="1200" b="1" dirty="0" smtClean="0"/>
+                <a:t>(</a:t>
+              </a:r>
+              <a:r>
+                <a:rPr lang="ko-KR" altLang="en-US" sz="1200" b="1" dirty="0" err="1" smtClean="0"/>
+                <a:t>다형성</a:t>
+              </a:r>
+              <a:r>
+                <a:rPr lang="ko-KR" altLang="en-US" sz="1200" b="1" dirty="0" smtClean="0"/>
+                <a:t> 이용</a:t>
+              </a:r>
+              <a:r>
+                <a:rPr lang="en-US" altLang="ko-KR" sz="1200" b="1" dirty="0" smtClean="0"/>
+                <a:t>)</a:t>
+              </a:r>
+              <a:endParaRPr lang="ko-KR" altLang="en-US" sz="1200" b="1" dirty="0"/>
+            </a:p>
+          </p:txBody>
+        </p:sp>
+        <p:sp>
+          <p:nvSpPr>
+            <p:cNvPr id="5" name="직사각형 4"/>
+            <p:cNvSpPr/>
+            <p:nvPr/>
+          </p:nvSpPr>
+          <p:spPr>
+            <a:xfrm>
+              <a:off x="5513117" y="3464175"/>
+              <a:ext cx="1871025" cy="261610"/>
+            </a:xfrm>
+            <a:prstGeom prst="rect">
+              <a:avLst/>
+            </a:prstGeom>
+          </p:spPr>
+          <p:txBody>
+            <a:bodyPr wrap="none">
+              <a:spAutoFit/>
+            </a:bodyPr>
+            <a:lstStyle/>
+            <a:p>
+              <a:pPr algn="ctr"/>
+              <a:r>
+                <a:rPr lang="en-US" altLang="ko-KR" sz="1100" b="1" dirty="0" err="1" smtClean="0"/>
+                <a:t>realSubject.operations</a:t>
+              </a:r>
+              <a:r>
+                <a:rPr lang="en-US" altLang="ko-KR" sz="1100" b="1" dirty="0" smtClean="0"/>
+                <a:t>();</a:t>
+              </a:r>
+              <a:endParaRPr lang="ko-KR" altLang="en-US" sz="1100" b="1" dirty="0"/>
+            </a:p>
+          </p:txBody>
+        </p:sp>
+        <p:cxnSp>
+          <p:nvCxnSpPr>
+            <p:cNvPr id="7" name="꺾인 연결선 6"/>
+            <p:cNvCxnSpPr>
+              <a:stCxn id="32" idx="3"/>
+              <a:endCxn id="22" idx="1"/>
+            </p:cNvCxnSpPr>
+            <p:nvPr/>
+          </p:nvCxnSpPr>
+          <p:spPr>
+            <a:xfrm flipV="1">
+              <a:off x="8088282" y="1150728"/>
+              <a:ext cx="923873" cy="2442431"/>
+            </a:xfrm>
+            <a:prstGeom prst="bentConnector3">
+              <a:avLst/>
+            </a:prstGeom>
+            <a:ln w="12700">
+              <a:tailEnd type="triangle"/>
+            </a:ln>
+          </p:spPr>
+          <p:style>
+            <a:lnRef idx="1">
+              <a:schemeClr val="dk1"/>
+            </a:lnRef>
+            <a:fillRef idx="0">
+              <a:schemeClr val="dk1"/>
+            </a:fillRef>
+            <a:effectRef idx="0">
+              <a:schemeClr val="dk1"/>
+            </a:effectRef>
+            <a:fontRef idx="minor">
+              <a:schemeClr val="tx1"/>
+            </a:fontRef>
+          </p:style>
+        </p:cxnSp>
+        <p:sp>
+          <p:nvSpPr>
+            <p:cNvPr id="8" name="TextBox 7"/>
+            <p:cNvSpPr txBox="1"/>
+            <p:nvPr/>
+          </p:nvSpPr>
+          <p:spPr>
+            <a:xfrm>
+              <a:off x="8218519" y="673376"/>
+              <a:ext cx="868451" cy="276999"/>
+            </a:xfrm>
+            <a:prstGeom prst="rect">
+              <a:avLst/>
+            </a:prstGeom>
+            <a:noFill/>
+          </p:spPr>
+          <p:txBody>
+            <a:bodyPr wrap="square" rtlCol="0">
+              <a:spAutoFit/>
+            </a:bodyPr>
+            <a:lstStyle/>
+            <a:p>
+              <a:r>
+                <a:rPr lang="en-US" altLang="ko-KR" sz="1200" dirty="0" smtClean="0">
+                  <a:solidFill>
+                    <a:schemeClr val="accent5"/>
+                  </a:solidFill>
+                </a:rPr>
+                <a:t>extends</a:t>
+              </a:r>
+              <a:endParaRPr lang="ko-KR" altLang="en-US" sz="1200" dirty="0">
+                <a:solidFill>
+                  <a:schemeClr val="accent5"/>
+                </a:solidFill>
+              </a:endParaRPr>
+            </a:p>
+          </p:txBody>
+        </p:sp>
+        <p:sp>
+          <p:nvSpPr>
+            <p:cNvPr id="10" name="TextBox 9"/>
+            <p:cNvSpPr txBox="1"/>
+            <p:nvPr/>
+          </p:nvSpPr>
+          <p:spPr>
+            <a:xfrm>
+              <a:off x="5707922" y="2680759"/>
+              <a:ext cx="1953793" cy="369332"/>
+            </a:xfrm>
+            <a:prstGeom prst="rect">
+              <a:avLst/>
+            </a:prstGeom>
+            <a:noFill/>
+          </p:spPr>
+          <p:txBody>
+            <a:bodyPr wrap="square" rtlCol="0">
+              <a:spAutoFit/>
+            </a:bodyPr>
+            <a:lstStyle/>
+            <a:p>
+              <a:r>
+                <a:rPr lang="en-US" altLang="ko-KR" dirty="0" smtClean="0"/>
+                <a:t>Logging start</a:t>
+              </a:r>
+              <a:endParaRPr lang="ko-KR" altLang="en-US" dirty="0"/>
+            </a:p>
+          </p:txBody>
+        </p:sp>
+        <p:sp>
+          <p:nvSpPr>
+            <p:cNvPr id="46" name="TextBox 45"/>
+            <p:cNvSpPr txBox="1"/>
+            <p:nvPr/>
+          </p:nvSpPr>
+          <p:spPr>
+            <a:xfrm>
+              <a:off x="5707922" y="4049435"/>
+              <a:ext cx="1953793" cy="369332"/>
+            </a:xfrm>
+            <a:prstGeom prst="rect">
+              <a:avLst/>
+            </a:prstGeom>
+            <a:noFill/>
+          </p:spPr>
+          <p:txBody>
+            <a:bodyPr wrap="square" rtlCol="0">
+              <a:spAutoFit/>
+            </a:bodyPr>
+            <a:lstStyle/>
+            <a:p>
+              <a:r>
+                <a:rPr lang="en-US" altLang="ko-KR" dirty="0" smtClean="0"/>
+                <a:t>Logging end</a:t>
+              </a:r>
+              <a:endParaRPr lang="ko-KR" altLang="en-US" dirty="0"/>
+            </a:p>
+          </p:txBody>
+        </p:sp>
+        <p:cxnSp>
+          <p:nvCxnSpPr>
+            <p:cNvPr id="12" name="꺾인 연결선 11"/>
+            <p:cNvCxnSpPr>
+              <a:stCxn id="3" idx="3"/>
+              <a:endCxn id="32" idx="1"/>
+            </p:cNvCxnSpPr>
+            <p:nvPr/>
+          </p:nvCxnSpPr>
+          <p:spPr>
+            <a:xfrm>
+              <a:off x="3167151" y="3021092"/>
+              <a:ext cx="1690252" cy="572067"/>
+            </a:xfrm>
+            <a:prstGeom prst="bentConnector3">
+              <a:avLst/>
+            </a:prstGeom>
+            <a:ln>
+              <a:tailEnd type="triangle"/>
+            </a:ln>
+          </p:spPr>
+          <p:style>
+            <a:lnRef idx="1">
+              <a:schemeClr val="accent1"/>
+            </a:lnRef>
+            <a:fillRef idx="0">
+              <a:schemeClr val="accent1"/>
+            </a:fillRef>
+            <a:effectRef idx="0">
+              <a:schemeClr val="accent1"/>
+            </a:effectRef>
+            <a:fontRef idx="minor">
+              <a:schemeClr val="tx1"/>
+            </a:fontRef>
+          </p:style>
+        </p:cxnSp>
+        <p:sp>
+          <p:nvSpPr>
+            <p:cNvPr id="13" name="TextBox 12"/>
+            <p:cNvSpPr txBox="1"/>
+            <p:nvPr/>
+          </p:nvSpPr>
+          <p:spPr>
+            <a:xfrm>
+              <a:off x="3273087" y="2425734"/>
+              <a:ext cx="1347545" cy="461665"/>
+            </a:xfrm>
+            <a:prstGeom prst="rect">
+              <a:avLst/>
+            </a:prstGeom>
+            <a:noFill/>
+          </p:spPr>
+          <p:txBody>
+            <a:bodyPr wrap="square" rtlCol="0">
+              <a:spAutoFit/>
+            </a:bodyPr>
+            <a:lstStyle/>
+            <a:p>
+              <a:pPr algn="ctr"/>
+              <a:r>
+                <a:rPr lang="en-US" altLang="ko-KR" sz="1200" b="1" dirty="0" smtClean="0"/>
+                <a:t>Dependency Injection</a:t>
+              </a:r>
+              <a:endParaRPr lang="ko-KR" altLang="en-US" sz="1200" b="1" dirty="0"/>
+            </a:p>
+          </p:txBody>
+        </p:sp>
+        <p:sp>
+          <p:nvSpPr>
+            <p:cNvPr id="49" name="TextBox 48"/>
+            <p:cNvSpPr txBox="1"/>
+            <p:nvPr/>
+          </p:nvSpPr>
+          <p:spPr>
+            <a:xfrm>
+              <a:off x="5469776" y="5823858"/>
+              <a:ext cx="2061554" cy="461665"/>
+            </a:xfrm>
+            <a:prstGeom prst="rect">
+              <a:avLst/>
+            </a:prstGeom>
+            <a:noFill/>
+          </p:spPr>
+          <p:txBody>
+            <a:bodyPr wrap="square" rtlCol="0">
+              <a:spAutoFit/>
+            </a:bodyPr>
+            <a:lstStyle/>
+            <a:p>
+              <a:pPr algn="ctr"/>
+              <a:r>
+                <a:rPr lang="ko-KR" altLang="en-US" sz="1200" b="1" dirty="0" smtClean="0"/>
+                <a:t>상속받은 </a:t>
+              </a:r>
+              <a:r>
+                <a:rPr lang="en-US" altLang="ko-KR" sz="1200" b="1" dirty="0" smtClean="0"/>
+                <a:t>Target </a:t>
+              </a:r>
+              <a:r>
+                <a:rPr lang="en-US" altLang="ko-KR" sz="1200" b="1" dirty="0" smtClean="0"/>
+                <a:t>Logic</a:t>
+              </a:r>
+              <a:r>
+                <a:rPr lang="ko-KR" altLang="en-US" sz="1200" b="1" dirty="0" smtClean="0"/>
+                <a:t>을 감싸서 </a:t>
+              </a:r>
+              <a:r>
+                <a:rPr lang="en-US" altLang="ko-KR" sz="1200" b="1" dirty="0" smtClean="0"/>
+                <a:t>Proxy</a:t>
+              </a:r>
+              <a:r>
+                <a:rPr lang="ko-KR" altLang="en-US" sz="1200" b="1" dirty="0" smtClean="0"/>
+                <a:t>기능을 추가</a:t>
+              </a:r>
+              <a:endParaRPr lang="ko-KR" altLang="en-US" sz="1200" b="1" dirty="0"/>
+            </a:p>
+          </p:txBody>
+        </p:sp>
+      </p:grpSp>
+    </p:spTree>
+    <p:extLst>
+      <p:ext uri="{BB962C8B-B14F-4D97-AF65-F5344CB8AC3E}">
+        <p14:creationId xmlns:p14="http://schemas.microsoft.com/office/powerpoint/2010/main" val="3393635227"/>
+      </p:ext>
+    </p:extLst>
+  </p:cSld>
+  <p:clrMapOvr>
+    <a:masterClrMapping/>
+  </p:clrMapOvr>
+</p:sld>
+</file>
+
+<file path=ppt/slides/slide9.xml><?xml version="1.0" encoding="utf-8"?>
 <p:sld xmlns:a="http://schemas.openxmlformats.org/drawingml/2006/main" xmlns:r="http://schemas.openxmlformats.org/officeDocument/2006/relationships" xmlns:p="http://schemas.openxmlformats.org/presentationml/2006/main">
   <p:cSld>
     <p:spTree>

</xml_diff>

<commit_message>
update) Desing Pattern pdf & pptx
</commit_message>
<xml_diff>
--- a/SpringFramework/SpringAdvanced/DesignPattern.pptx
+++ b/SpringFramework/SpringAdvanced/DesignPattern.pptx
@@ -13,7 +13,8 @@
     <p:sldId id="265" r:id="rId7"/>
     <p:sldId id="266" r:id="rId8"/>
     <p:sldId id="267" r:id="rId9"/>
-    <p:sldId id="264" r:id="rId10"/>
+    <p:sldId id="268" r:id="rId10"/>
+    <p:sldId id="264" r:id="rId11"/>
   </p:sldIdLst>
   <p:sldSz cx="12192000" cy="6858000"/>
   <p:notesSz cx="6858000" cy="9144000"/>
@@ -3809,6 +3810,931 @@
     <p:extLst>
       <p:ext uri="{BB962C8B-B14F-4D97-AF65-F5344CB8AC3E}">
         <p14:creationId xmlns:p14="http://schemas.microsoft.com/office/powerpoint/2010/main" val="2418986014"/>
+      </p:ext>
+    </p:extLst>
+  </p:cSld>
+  <p:clrMapOvr>
+    <a:masterClrMapping/>
+  </p:clrMapOvr>
+</p:sld>
+</file>
+
+<file path=ppt/slides/slide10.xml><?xml version="1.0" encoding="utf-8"?>
+<p:sld xmlns:a="http://schemas.openxmlformats.org/drawingml/2006/main" xmlns:r="http://schemas.openxmlformats.org/officeDocument/2006/relationships" xmlns:p="http://schemas.openxmlformats.org/presentationml/2006/main">
+  <p:cSld>
+    <p:spTree>
+      <p:nvGrpSpPr>
+        <p:cNvPr id="1" name=""/>
+        <p:cNvGrpSpPr/>
+        <p:nvPr/>
+      </p:nvGrpSpPr>
+      <p:grpSpPr>
+        <a:xfrm>
+          <a:off x="0" y="0"/>
+          <a:ext cx="0" cy="0"/>
+          <a:chOff x="0" y="0"/>
+          <a:chExt cx="0" cy="0"/>
+        </a:xfrm>
+      </p:grpSpPr>
+      <p:sp>
+        <p:nvSpPr>
+          <p:cNvPr id="2" name="TextBox 1"/>
+          <p:cNvSpPr txBox="1"/>
+          <p:nvPr/>
+        </p:nvSpPr>
+        <p:spPr>
+          <a:xfrm>
+            <a:off x="274320" y="182880"/>
+            <a:ext cx="7922029" cy="338554"/>
+          </a:xfrm>
+          <a:prstGeom prst="rect">
+            <a:avLst/>
+          </a:prstGeom>
+          <a:noFill/>
+        </p:spPr>
+        <p:txBody>
+          <a:bodyPr wrap="square" rtlCol="0">
+            <a:spAutoFit/>
+          </a:bodyPr>
+          <a:lstStyle/>
+          <a:p>
+            <a:r>
+              <a:rPr lang="en-US" altLang="ko-KR" sz="1600" dirty="0" smtClean="0">
+                <a:latin typeface="Times New Roman" panose="02020603050405020304" pitchFamily="18" charset="0"/>
+                <a:cs typeface="Times New Roman" panose="02020603050405020304" pitchFamily="18" charset="0"/>
+              </a:rPr>
+              <a:t>Proxy Pattern (Runtime </a:t>
+            </a:r>
+            <a:r>
+              <a:rPr lang="ko-KR" altLang="en-US" sz="1600" dirty="0" smtClean="0">
+                <a:latin typeface="Times New Roman" panose="02020603050405020304" pitchFamily="18" charset="0"/>
+                <a:cs typeface="Times New Roman" panose="02020603050405020304" pitchFamily="18" charset="0"/>
+              </a:rPr>
+              <a:t>의존관계</a:t>
+            </a:r>
+            <a:r>
+              <a:rPr lang="en-US" altLang="ko-KR" sz="1600" dirty="0" smtClean="0">
+                <a:latin typeface="Times New Roman" panose="02020603050405020304" pitchFamily="18" charset="0"/>
+                <a:cs typeface="Times New Roman" panose="02020603050405020304" pitchFamily="18" charset="0"/>
+              </a:rPr>
+              <a:t>) – </a:t>
+            </a:r>
+            <a:r>
+              <a:rPr lang="ko-KR" altLang="en-US" sz="1600" dirty="0" smtClean="0">
+                <a:latin typeface="Times New Roman" panose="02020603050405020304" pitchFamily="18" charset="0"/>
+                <a:cs typeface="Times New Roman" panose="02020603050405020304" pitchFamily="18" charset="0"/>
+              </a:rPr>
+              <a:t>결론적으로 얘기하자면 아래와 같다</a:t>
+            </a:r>
+            <a:r>
+              <a:rPr lang="en-US" altLang="ko-KR" sz="1600" dirty="0" smtClean="0">
+                <a:latin typeface="Times New Roman" panose="02020603050405020304" pitchFamily="18" charset="0"/>
+                <a:cs typeface="Times New Roman" panose="02020603050405020304" pitchFamily="18" charset="0"/>
+              </a:rPr>
+              <a:t>.</a:t>
+            </a:r>
+            <a:endParaRPr lang="en-US" altLang="ko-KR" sz="1200" dirty="0" smtClean="0">
+              <a:latin typeface="Times New Roman" panose="02020603050405020304" pitchFamily="18" charset="0"/>
+              <a:cs typeface="Times New Roman" panose="02020603050405020304" pitchFamily="18" charset="0"/>
+            </a:endParaRPr>
+          </a:p>
+        </p:txBody>
+      </p:sp>
+      <p:grpSp>
+        <p:nvGrpSpPr>
+          <p:cNvPr id="5" name="그룹 4"/>
+          <p:cNvGrpSpPr/>
+          <p:nvPr/>
+        </p:nvGrpSpPr>
+        <p:grpSpPr>
+          <a:xfrm>
+            <a:off x="1130531" y="1130532"/>
+            <a:ext cx="9642764" cy="1213658"/>
+            <a:chOff x="1496291" y="1296786"/>
+            <a:chExt cx="9642764" cy="1213658"/>
+          </a:xfrm>
+        </p:grpSpPr>
+        <p:sp>
+          <p:nvSpPr>
+            <p:cNvPr id="3" name="모서리가 둥근 직사각형 2"/>
+            <p:cNvSpPr/>
+            <p:nvPr/>
+          </p:nvSpPr>
+          <p:spPr>
+            <a:xfrm>
+              <a:off x="1496291" y="1296786"/>
+              <a:ext cx="2576946" cy="1213658"/>
+            </a:xfrm>
+            <a:prstGeom prst="roundRect">
+              <a:avLst/>
+            </a:prstGeom>
+            <a:noFill/>
+            <a:ln>
+              <a:solidFill>
+                <a:schemeClr val="tx1"/>
+              </a:solidFill>
+            </a:ln>
+          </p:spPr>
+          <p:style>
+            <a:lnRef idx="2">
+              <a:schemeClr val="accent1">
+                <a:shade val="50000"/>
+              </a:schemeClr>
+            </a:lnRef>
+            <a:fillRef idx="1">
+              <a:schemeClr val="accent1"/>
+            </a:fillRef>
+            <a:effectRef idx="0">
+              <a:schemeClr val="accent1"/>
+            </a:effectRef>
+            <a:fontRef idx="minor">
+              <a:schemeClr val="lt1"/>
+            </a:fontRef>
+          </p:style>
+          <p:txBody>
+            <a:bodyPr rtlCol="0" anchor="ctr"/>
+            <a:lstStyle/>
+            <a:p>
+              <a:pPr algn="ctr"/>
+              <a:r>
+                <a:rPr lang="en-US" altLang="ko-KR" dirty="0" smtClean="0">
+                  <a:solidFill>
+                    <a:schemeClr val="tx1"/>
+                  </a:solidFill>
+                </a:rPr>
+                <a:t>Client</a:t>
+              </a:r>
+              <a:endParaRPr lang="ko-KR" altLang="en-US" dirty="0">
+                <a:solidFill>
+                  <a:schemeClr val="tx1"/>
+                </a:solidFill>
+              </a:endParaRPr>
+            </a:p>
+          </p:txBody>
+        </p:sp>
+        <p:sp>
+          <p:nvSpPr>
+            <p:cNvPr id="32" name="모서리가 둥근 직사각형 31"/>
+            <p:cNvSpPr/>
+            <p:nvPr/>
+          </p:nvSpPr>
+          <p:spPr>
+            <a:xfrm>
+              <a:off x="5029200" y="1296786"/>
+              <a:ext cx="2576946" cy="1213658"/>
+            </a:xfrm>
+            <a:prstGeom prst="roundRect">
+              <a:avLst/>
+            </a:prstGeom>
+            <a:noFill/>
+            <a:ln>
+              <a:solidFill>
+                <a:schemeClr val="tx1"/>
+              </a:solidFill>
+            </a:ln>
+          </p:spPr>
+          <p:style>
+            <a:lnRef idx="2">
+              <a:schemeClr val="accent1">
+                <a:shade val="50000"/>
+              </a:schemeClr>
+            </a:lnRef>
+            <a:fillRef idx="1">
+              <a:schemeClr val="accent1"/>
+            </a:fillRef>
+            <a:effectRef idx="0">
+              <a:schemeClr val="accent1"/>
+            </a:effectRef>
+            <a:fontRef idx="minor">
+              <a:schemeClr val="lt1"/>
+            </a:fontRef>
+          </p:style>
+          <p:txBody>
+            <a:bodyPr rtlCol="0" anchor="ctr"/>
+            <a:lstStyle/>
+            <a:p>
+              <a:pPr algn="ctr"/>
+              <a:r>
+                <a:rPr lang="en-US" altLang="ko-KR" dirty="0" smtClean="0">
+                  <a:solidFill>
+                    <a:schemeClr val="tx1"/>
+                  </a:solidFill>
+                </a:rPr>
+                <a:t>Proxy</a:t>
+              </a:r>
+              <a:endParaRPr lang="ko-KR" altLang="en-US" dirty="0">
+                <a:solidFill>
+                  <a:schemeClr val="tx1"/>
+                </a:solidFill>
+              </a:endParaRPr>
+            </a:p>
+          </p:txBody>
+        </p:sp>
+        <p:sp>
+          <p:nvSpPr>
+            <p:cNvPr id="34" name="모서리가 둥근 직사각형 33"/>
+            <p:cNvSpPr/>
+            <p:nvPr/>
+          </p:nvSpPr>
+          <p:spPr>
+            <a:xfrm>
+              <a:off x="8562109" y="1296786"/>
+              <a:ext cx="2576946" cy="1213658"/>
+            </a:xfrm>
+            <a:prstGeom prst="roundRect">
+              <a:avLst/>
+            </a:prstGeom>
+            <a:noFill/>
+            <a:ln>
+              <a:solidFill>
+                <a:schemeClr val="tx1"/>
+              </a:solidFill>
+            </a:ln>
+          </p:spPr>
+          <p:style>
+            <a:lnRef idx="2">
+              <a:schemeClr val="accent1">
+                <a:shade val="50000"/>
+              </a:schemeClr>
+            </a:lnRef>
+            <a:fillRef idx="1">
+              <a:schemeClr val="accent1"/>
+            </a:fillRef>
+            <a:effectRef idx="0">
+              <a:schemeClr val="accent1"/>
+            </a:effectRef>
+            <a:fontRef idx="minor">
+              <a:schemeClr val="lt1"/>
+            </a:fontRef>
+          </p:style>
+          <p:txBody>
+            <a:bodyPr rtlCol="0" anchor="ctr"/>
+            <a:lstStyle/>
+            <a:p>
+              <a:pPr algn="ctr"/>
+              <a:r>
+                <a:rPr lang="en-US" altLang="ko-KR" dirty="0" err="1">
+                  <a:solidFill>
+                    <a:schemeClr val="tx1"/>
+                  </a:solidFill>
+                </a:rPr>
+                <a:t>R</a:t>
+              </a:r>
+              <a:r>
+                <a:rPr lang="en-US" altLang="ko-KR" dirty="0" err="1" smtClean="0">
+                  <a:solidFill>
+                    <a:schemeClr val="tx1"/>
+                  </a:solidFill>
+                </a:rPr>
+                <a:t>ealSubject</a:t>
+              </a:r>
+              <a:endParaRPr lang="ko-KR" altLang="en-US" dirty="0">
+                <a:solidFill>
+                  <a:schemeClr val="tx1"/>
+                </a:solidFill>
+              </a:endParaRPr>
+            </a:p>
+          </p:txBody>
+        </p:sp>
+        <p:cxnSp>
+          <p:nvCxnSpPr>
+            <p:cNvPr id="14" name="직선 화살표 연결선 13"/>
+            <p:cNvCxnSpPr>
+              <a:stCxn id="3" idx="3"/>
+            </p:cNvCxnSpPr>
+            <p:nvPr/>
+          </p:nvCxnSpPr>
+          <p:spPr>
+            <a:xfrm>
+              <a:off x="4073237" y="1903615"/>
+              <a:ext cx="955963" cy="0"/>
+            </a:xfrm>
+            <a:prstGeom prst="straightConnector1">
+              <a:avLst/>
+            </a:prstGeom>
+            <a:ln>
+              <a:tailEnd type="triangle"/>
+            </a:ln>
+          </p:spPr>
+          <p:style>
+            <a:lnRef idx="1">
+              <a:schemeClr val="accent1"/>
+            </a:lnRef>
+            <a:fillRef idx="0">
+              <a:schemeClr val="accent1"/>
+            </a:fillRef>
+            <a:effectRef idx="0">
+              <a:schemeClr val="accent1"/>
+            </a:effectRef>
+            <a:fontRef idx="minor">
+              <a:schemeClr val="tx1"/>
+            </a:fontRef>
+          </p:style>
+        </p:cxnSp>
+        <p:cxnSp>
+          <p:nvCxnSpPr>
+            <p:cNvPr id="11" name="직선 화살표 연결선 10"/>
+            <p:cNvCxnSpPr/>
+            <p:nvPr/>
+          </p:nvCxnSpPr>
+          <p:spPr>
+            <a:xfrm>
+              <a:off x="7606146" y="1903615"/>
+              <a:ext cx="955963" cy="0"/>
+            </a:xfrm>
+            <a:prstGeom prst="straightConnector1">
+              <a:avLst/>
+            </a:prstGeom>
+            <a:ln>
+              <a:tailEnd type="triangle"/>
+            </a:ln>
+          </p:spPr>
+          <p:style>
+            <a:lnRef idx="1">
+              <a:schemeClr val="accent1"/>
+            </a:lnRef>
+            <a:fillRef idx="0">
+              <a:schemeClr val="accent1"/>
+            </a:fillRef>
+            <a:effectRef idx="0">
+              <a:schemeClr val="accent1"/>
+            </a:effectRef>
+            <a:fontRef idx="minor">
+              <a:schemeClr val="tx1"/>
+            </a:fontRef>
+          </p:style>
+        </p:cxnSp>
+      </p:grpSp>
+      <p:sp>
+        <p:nvSpPr>
+          <p:cNvPr id="13" name="직사각형 12"/>
+          <p:cNvSpPr/>
+          <p:nvPr/>
+        </p:nvSpPr>
+        <p:spPr>
+          <a:xfrm>
+            <a:off x="3657407" y="1402075"/>
+            <a:ext cx="1072730" cy="276999"/>
+          </a:xfrm>
+          <a:prstGeom prst="rect">
+            <a:avLst/>
+          </a:prstGeom>
+        </p:spPr>
+        <p:txBody>
+          <a:bodyPr wrap="none">
+            <a:spAutoFit/>
+          </a:bodyPr>
+          <a:lstStyle/>
+          <a:p>
+            <a:r>
+              <a:rPr lang="en-US" altLang="ko-KR" sz="1200" b="1" dirty="0"/>
+              <a:t>operations()</a:t>
+            </a:r>
+            <a:endParaRPr lang="ko-KR" altLang="en-US" sz="1200" b="1" dirty="0"/>
+          </a:p>
+        </p:txBody>
+      </p:sp>
+      <p:sp>
+        <p:nvSpPr>
+          <p:cNvPr id="15" name="직사각형 14"/>
+          <p:cNvSpPr/>
+          <p:nvPr/>
+        </p:nvSpPr>
+        <p:spPr>
+          <a:xfrm>
+            <a:off x="7182002" y="1402074"/>
+            <a:ext cx="1072730" cy="276999"/>
+          </a:xfrm>
+          <a:prstGeom prst="rect">
+            <a:avLst/>
+          </a:prstGeom>
+        </p:spPr>
+        <p:txBody>
+          <a:bodyPr wrap="none">
+            <a:spAutoFit/>
+          </a:bodyPr>
+          <a:lstStyle/>
+          <a:p>
+            <a:r>
+              <a:rPr lang="en-US" altLang="ko-KR" sz="1200" b="1" dirty="0"/>
+              <a:t>operations()</a:t>
+            </a:r>
+            <a:endParaRPr lang="ko-KR" altLang="en-US" sz="1200" b="1" dirty="0"/>
+          </a:p>
+        </p:txBody>
+      </p:sp>
+      <p:sp>
+        <p:nvSpPr>
+          <p:cNvPr id="23" name="직사각형 22"/>
+          <p:cNvSpPr/>
+          <p:nvPr/>
+        </p:nvSpPr>
+        <p:spPr>
+          <a:xfrm>
+            <a:off x="3261167" y="4678727"/>
+            <a:ext cx="1072730" cy="276999"/>
+          </a:xfrm>
+          <a:prstGeom prst="rect">
+            <a:avLst/>
+          </a:prstGeom>
+        </p:spPr>
+        <p:txBody>
+          <a:bodyPr wrap="none">
+            <a:spAutoFit/>
+          </a:bodyPr>
+          <a:lstStyle/>
+          <a:p>
+            <a:r>
+              <a:rPr lang="en-US" altLang="ko-KR" sz="1200" b="1" dirty="0"/>
+              <a:t>operations()</a:t>
+            </a:r>
+            <a:endParaRPr lang="ko-KR" altLang="en-US" sz="1200" b="1" dirty="0"/>
+          </a:p>
+        </p:txBody>
+      </p:sp>
+      <p:sp>
+        <p:nvSpPr>
+          <p:cNvPr id="24" name="직사각형 23"/>
+          <p:cNvSpPr/>
+          <p:nvPr/>
+        </p:nvSpPr>
+        <p:spPr>
+          <a:xfrm>
+            <a:off x="5630987" y="5055525"/>
+            <a:ext cx="1072730" cy="276999"/>
+          </a:xfrm>
+          <a:prstGeom prst="rect">
+            <a:avLst/>
+          </a:prstGeom>
+        </p:spPr>
+        <p:txBody>
+          <a:bodyPr wrap="none">
+            <a:spAutoFit/>
+          </a:bodyPr>
+          <a:lstStyle/>
+          <a:p>
+            <a:r>
+              <a:rPr lang="en-US" altLang="ko-KR" sz="1200" b="1" dirty="0"/>
+              <a:t>operations()</a:t>
+            </a:r>
+            <a:endParaRPr lang="ko-KR" altLang="en-US" sz="1200" b="1" dirty="0"/>
+          </a:p>
+        </p:txBody>
+      </p:sp>
+      <p:grpSp>
+        <p:nvGrpSpPr>
+          <p:cNvPr id="8" name="그룹 7"/>
+          <p:cNvGrpSpPr/>
+          <p:nvPr/>
+        </p:nvGrpSpPr>
+        <p:grpSpPr>
+          <a:xfrm>
+            <a:off x="742604" y="3973488"/>
+            <a:ext cx="10870277" cy="1216426"/>
+            <a:chOff x="742604" y="3973488"/>
+            <a:chExt cx="10870277" cy="1216426"/>
+          </a:xfrm>
+        </p:grpSpPr>
+        <p:sp>
+          <p:nvSpPr>
+            <p:cNvPr id="17" name="모서리가 둥근 직사각형 16"/>
+            <p:cNvSpPr/>
+            <p:nvPr/>
+          </p:nvSpPr>
+          <p:spPr>
+            <a:xfrm>
+              <a:off x="742604" y="3976256"/>
+              <a:ext cx="2576946" cy="1213658"/>
+            </a:xfrm>
+            <a:prstGeom prst="roundRect">
+              <a:avLst/>
+            </a:prstGeom>
+            <a:noFill/>
+            <a:ln>
+              <a:solidFill>
+                <a:schemeClr val="tx1"/>
+              </a:solidFill>
+            </a:ln>
+          </p:spPr>
+          <p:style>
+            <a:lnRef idx="2">
+              <a:schemeClr val="accent1">
+                <a:shade val="50000"/>
+              </a:schemeClr>
+            </a:lnRef>
+            <a:fillRef idx="1">
+              <a:schemeClr val="accent1"/>
+            </a:fillRef>
+            <a:effectRef idx="0">
+              <a:schemeClr val="accent1"/>
+            </a:effectRef>
+            <a:fontRef idx="minor">
+              <a:schemeClr val="lt1"/>
+            </a:fontRef>
+          </p:style>
+          <p:txBody>
+            <a:bodyPr rtlCol="0" anchor="ctr"/>
+            <a:lstStyle/>
+            <a:p>
+              <a:pPr algn="ctr"/>
+              <a:r>
+                <a:rPr lang="en-US" altLang="ko-KR" dirty="0" smtClean="0">
+                  <a:solidFill>
+                    <a:schemeClr val="tx1"/>
+                  </a:solidFill>
+                </a:rPr>
+                <a:t>Client</a:t>
+              </a:r>
+              <a:endParaRPr lang="ko-KR" altLang="en-US" dirty="0">
+                <a:solidFill>
+                  <a:schemeClr val="tx1"/>
+                </a:solidFill>
+              </a:endParaRPr>
+            </a:p>
+          </p:txBody>
+        </p:sp>
+        <p:sp>
+          <p:nvSpPr>
+            <p:cNvPr id="19" name="모서리가 둥근 직사각형 18"/>
+            <p:cNvSpPr/>
+            <p:nvPr/>
+          </p:nvSpPr>
+          <p:spPr>
+            <a:xfrm>
+              <a:off x="4275513" y="4114802"/>
+              <a:ext cx="1620983" cy="936566"/>
+            </a:xfrm>
+            <a:prstGeom prst="roundRect">
+              <a:avLst/>
+            </a:prstGeom>
+            <a:noFill/>
+            <a:ln>
+              <a:solidFill>
+                <a:schemeClr val="tx1"/>
+              </a:solidFill>
+            </a:ln>
+          </p:spPr>
+          <p:style>
+            <a:lnRef idx="2">
+              <a:schemeClr val="accent1">
+                <a:shade val="50000"/>
+              </a:schemeClr>
+            </a:lnRef>
+            <a:fillRef idx="1">
+              <a:schemeClr val="accent1"/>
+            </a:fillRef>
+            <a:effectRef idx="0">
+              <a:schemeClr val="accent1"/>
+            </a:effectRef>
+            <a:fontRef idx="minor">
+              <a:schemeClr val="lt1"/>
+            </a:fontRef>
+          </p:style>
+          <p:txBody>
+            <a:bodyPr rtlCol="0" anchor="ctr"/>
+            <a:lstStyle/>
+            <a:p>
+              <a:pPr algn="ctr"/>
+              <a:r>
+                <a:rPr lang="en-US" altLang="ko-KR" dirty="0" smtClean="0">
+                  <a:solidFill>
+                    <a:schemeClr val="tx1"/>
+                  </a:solidFill>
+                </a:rPr>
+                <a:t>Proxy</a:t>
+              </a:r>
+              <a:endParaRPr lang="ko-KR" altLang="en-US" dirty="0">
+                <a:solidFill>
+                  <a:schemeClr val="tx1"/>
+                </a:solidFill>
+              </a:endParaRPr>
+            </a:p>
+          </p:txBody>
+        </p:sp>
+        <p:sp>
+          <p:nvSpPr>
+            <p:cNvPr id="20" name="모서리가 둥근 직사각형 19"/>
+            <p:cNvSpPr/>
+            <p:nvPr/>
+          </p:nvSpPr>
+          <p:spPr>
+            <a:xfrm>
+              <a:off x="9035935" y="3973488"/>
+              <a:ext cx="2576946" cy="1213658"/>
+            </a:xfrm>
+            <a:prstGeom prst="roundRect">
+              <a:avLst/>
+            </a:prstGeom>
+            <a:noFill/>
+            <a:ln>
+              <a:solidFill>
+                <a:schemeClr val="tx1"/>
+              </a:solidFill>
+            </a:ln>
+          </p:spPr>
+          <p:style>
+            <a:lnRef idx="2">
+              <a:schemeClr val="accent1">
+                <a:shade val="50000"/>
+              </a:schemeClr>
+            </a:lnRef>
+            <a:fillRef idx="1">
+              <a:schemeClr val="accent1"/>
+            </a:fillRef>
+            <a:effectRef idx="0">
+              <a:schemeClr val="accent1"/>
+            </a:effectRef>
+            <a:fontRef idx="minor">
+              <a:schemeClr val="lt1"/>
+            </a:fontRef>
+          </p:style>
+          <p:txBody>
+            <a:bodyPr rtlCol="0" anchor="ctr"/>
+            <a:lstStyle/>
+            <a:p>
+              <a:pPr algn="ctr"/>
+              <a:r>
+                <a:rPr lang="en-US" altLang="ko-KR" dirty="0" err="1">
+                  <a:solidFill>
+                    <a:schemeClr val="tx1"/>
+                  </a:solidFill>
+                </a:rPr>
+                <a:t>R</a:t>
+              </a:r>
+              <a:r>
+                <a:rPr lang="en-US" altLang="ko-KR" dirty="0" err="1" smtClean="0">
+                  <a:solidFill>
+                    <a:schemeClr val="tx1"/>
+                  </a:solidFill>
+                </a:rPr>
+                <a:t>ealSubject</a:t>
+              </a:r>
+              <a:endParaRPr lang="ko-KR" altLang="en-US" dirty="0">
+                <a:solidFill>
+                  <a:schemeClr val="tx1"/>
+                </a:solidFill>
+              </a:endParaRPr>
+            </a:p>
+          </p:txBody>
+        </p:sp>
+        <p:cxnSp>
+          <p:nvCxnSpPr>
+            <p:cNvPr id="21" name="직선 화살표 연결선 20"/>
+            <p:cNvCxnSpPr>
+              <a:stCxn id="17" idx="3"/>
+            </p:cNvCxnSpPr>
+            <p:nvPr/>
+          </p:nvCxnSpPr>
+          <p:spPr>
+            <a:xfrm>
+              <a:off x="3319550" y="4583085"/>
+              <a:ext cx="955963" cy="0"/>
+            </a:xfrm>
+            <a:prstGeom prst="straightConnector1">
+              <a:avLst/>
+            </a:prstGeom>
+            <a:ln>
+              <a:tailEnd type="triangle"/>
+            </a:ln>
+          </p:spPr>
+          <p:style>
+            <a:lnRef idx="1">
+              <a:schemeClr val="accent1"/>
+            </a:lnRef>
+            <a:fillRef idx="0">
+              <a:schemeClr val="accent1"/>
+            </a:fillRef>
+            <a:effectRef idx="0">
+              <a:schemeClr val="accent1"/>
+            </a:effectRef>
+            <a:fontRef idx="minor">
+              <a:schemeClr val="tx1"/>
+            </a:fontRef>
+          </p:style>
+        </p:cxnSp>
+        <p:cxnSp>
+          <p:nvCxnSpPr>
+            <p:cNvPr id="22" name="직선 화살표 연결선 21"/>
+            <p:cNvCxnSpPr/>
+            <p:nvPr/>
+          </p:nvCxnSpPr>
+          <p:spPr>
+            <a:xfrm>
+              <a:off x="8079972" y="4580317"/>
+              <a:ext cx="955963" cy="0"/>
+            </a:xfrm>
+            <a:prstGeom prst="straightConnector1">
+              <a:avLst/>
+            </a:prstGeom>
+            <a:ln>
+              <a:tailEnd type="triangle"/>
+            </a:ln>
+          </p:spPr>
+          <p:style>
+            <a:lnRef idx="1">
+              <a:schemeClr val="accent1"/>
+            </a:lnRef>
+            <a:fillRef idx="0">
+              <a:schemeClr val="accent1"/>
+            </a:fillRef>
+            <a:effectRef idx="0">
+              <a:schemeClr val="accent1"/>
+            </a:effectRef>
+            <a:fontRef idx="minor">
+              <a:schemeClr val="tx1"/>
+            </a:fontRef>
+          </p:style>
+        </p:cxnSp>
+        <p:sp>
+          <p:nvSpPr>
+            <p:cNvPr id="25" name="모서리가 둥근 직사각형 24"/>
+            <p:cNvSpPr/>
+            <p:nvPr/>
+          </p:nvSpPr>
+          <p:spPr>
+            <a:xfrm>
+              <a:off x="6438208" y="4112034"/>
+              <a:ext cx="1620983" cy="936566"/>
+            </a:xfrm>
+            <a:prstGeom prst="roundRect">
+              <a:avLst/>
+            </a:prstGeom>
+            <a:noFill/>
+            <a:ln>
+              <a:solidFill>
+                <a:schemeClr val="tx1"/>
+              </a:solidFill>
+            </a:ln>
+          </p:spPr>
+          <p:style>
+            <a:lnRef idx="2">
+              <a:schemeClr val="accent1">
+                <a:shade val="50000"/>
+              </a:schemeClr>
+            </a:lnRef>
+            <a:fillRef idx="1">
+              <a:schemeClr val="accent1"/>
+            </a:fillRef>
+            <a:effectRef idx="0">
+              <a:schemeClr val="accent1"/>
+            </a:effectRef>
+            <a:fontRef idx="minor">
+              <a:schemeClr val="lt1"/>
+            </a:fontRef>
+          </p:style>
+          <p:txBody>
+            <a:bodyPr rtlCol="0" anchor="ctr"/>
+            <a:lstStyle/>
+            <a:p>
+              <a:pPr algn="ctr"/>
+              <a:r>
+                <a:rPr lang="en-US" altLang="ko-KR" dirty="0" smtClean="0">
+                  <a:solidFill>
+                    <a:schemeClr val="tx1"/>
+                  </a:solidFill>
+                </a:rPr>
+                <a:t>Proxy</a:t>
+              </a:r>
+              <a:endParaRPr lang="ko-KR" altLang="en-US" dirty="0">
+                <a:solidFill>
+                  <a:schemeClr val="tx1"/>
+                </a:solidFill>
+              </a:endParaRPr>
+            </a:p>
+          </p:txBody>
+        </p:sp>
+        <p:cxnSp>
+          <p:nvCxnSpPr>
+            <p:cNvPr id="26" name="직선 화살표 연결선 25"/>
+            <p:cNvCxnSpPr>
+              <a:stCxn id="19" idx="3"/>
+              <a:endCxn id="25" idx="1"/>
+            </p:cNvCxnSpPr>
+            <p:nvPr/>
+          </p:nvCxnSpPr>
+          <p:spPr>
+            <a:xfrm flipV="1">
+              <a:off x="5896496" y="4580317"/>
+              <a:ext cx="541712" cy="2768"/>
+            </a:xfrm>
+            <a:prstGeom prst="straightConnector1">
+              <a:avLst/>
+            </a:prstGeom>
+            <a:ln>
+              <a:tailEnd type="triangle"/>
+            </a:ln>
+          </p:spPr>
+          <p:style>
+            <a:lnRef idx="1">
+              <a:schemeClr val="accent1"/>
+            </a:lnRef>
+            <a:fillRef idx="0">
+              <a:schemeClr val="accent1"/>
+            </a:fillRef>
+            <a:effectRef idx="0">
+              <a:schemeClr val="accent1"/>
+            </a:effectRef>
+            <a:fontRef idx="minor">
+              <a:schemeClr val="tx1"/>
+            </a:fontRef>
+          </p:style>
+        </p:cxnSp>
+      </p:grpSp>
+      <p:sp>
+        <p:nvSpPr>
+          <p:cNvPr id="28" name="직사각형 27"/>
+          <p:cNvSpPr/>
+          <p:nvPr/>
+        </p:nvSpPr>
+        <p:spPr>
+          <a:xfrm>
+            <a:off x="8021589" y="4644881"/>
+            <a:ext cx="1072730" cy="276999"/>
+          </a:xfrm>
+          <a:prstGeom prst="rect">
+            <a:avLst/>
+          </a:prstGeom>
+        </p:spPr>
+        <p:txBody>
+          <a:bodyPr wrap="none">
+            <a:spAutoFit/>
+          </a:bodyPr>
+          <a:lstStyle/>
+          <a:p>
+            <a:r>
+              <a:rPr lang="en-US" altLang="ko-KR" sz="1200" b="1" dirty="0"/>
+              <a:t>operations()</a:t>
+            </a:r>
+            <a:endParaRPr lang="ko-KR" altLang="en-US" sz="1200" b="1" dirty="0"/>
+          </a:p>
+        </p:txBody>
+      </p:sp>
+      <p:sp>
+        <p:nvSpPr>
+          <p:cNvPr id="9" name="TextBox 8"/>
+          <p:cNvSpPr txBox="1"/>
+          <p:nvPr/>
+        </p:nvSpPr>
+        <p:spPr>
+          <a:xfrm>
+            <a:off x="985750" y="5804964"/>
+            <a:ext cx="5623561" cy="276999"/>
+          </a:xfrm>
+          <a:prstGeom prst="rect">
+            <a:avLst/>
+          </a:prstGeom>
+          <a:noFill/>
+        </p:spPr>
+        <p:txBody>
+          <a:bodyPr wrap="square" rtlCol="0">
+            <a:spAutoFit/>
+          </a:bodyPr>
+          <a:lstStyle/>
+          <a:p>
+            <a:r>
+              <a:rPr lang="en-US" altLang="ko-KR" sz="1200" dirty="0" smtClean="0"/>
+              <a:t>Client, Target</a:t>
+            </a:r>
+            <a:r>
+              <a:rPr lang="ko-KR" altLang="en-US" sz="1200" dirty="0" smtClean="0"/>
+              <a:t>은 전혀 건들지않고 </a:t>
+            </a:r>
+            <a:r>
+              <a:rPr lang="en-US" altLang="ko-KR" sz="1200" dirty="0" smtClean="0"/>
+              <a:t>Proxy</a:t>
+            </a:r>
+            <a:r>
+              <a:rPr lang="ko-KR" altLang="en-US" sz="1200" dirty="0" smtClean="0"/>
+              <a:t>만 </a:t>
+            </a:r>
+            <a:r>
+              <a:rPr lang="en-US" altLang="ko-KR" sz="1200" dirty="0" smtClean="0"/>
+              <a:t>chain</a:t>
+            </a:r>
+            <a:r>
+              <a:rPr lang="ko-KR" altLang="en-US" sz="1200" dirty="0" smtClean="0"/>
+              <a:t>으로 계속 넣어서 </a:t>
+            </a:r>
+            <a:r>
+              <a:rPr lang="ko-KR" altLang="en-US" sz="1200" dirty="0" err="1" smtClean="0"/>
+              <a:t>꾸밀수</a:t>
+            </a:r>
+            <a:r>
+              <a:rPr lang="ko-KR" altLang="en-US" sz="1200" dirty="0" smtClean="0"/>
+              <a:t> 있다</a:t>
+            </a:r>
+            <a:r>
+              <a:rPr lang="en-US" altLang="ko-KR" sz="1200" dirty="0" smtClean="0"/>
+              <a:t>.</a:t>
+            </a:r>
+            <a:endParaRPr lang="ko-KR" altLang="en-US" sz="1200" dirty="0"/>
+          </a:p>
+        </p:txBody>
+      </p:sp>
+    </p:spTree>
+    <p:extLst>
+      <p:ext uri="{BB962C8B-B14F-4D97-AF65-F5344CB8AC3E}">
+        <p14:creationId xmlns:p14="http://schemas.microsoft.com/office/powerpoint/2010/main" val="1288125639"/>
       </p:ext>
     </p:extLst>
   </p:cSld>
@@ -9605,11 +10531,7 @@
               </a:r>
               <a:r>
                 <a:rPr lang="en-US" altLang="ko-KR" sz="1200" b="1" dirty="0" smtClean="0"/>
-                <a:t>Target </a:t>
-              </a:r>
-              <a:r>
-                <a:rPr lang="en-US" altLang="ko-KR" sz="1200" b="1" dirty="0" smtClean="0"/>
-                <a:t>Logic</a:t>
+                <a:t>Target Logic</a:t>
               </a:r>
               <a:r>
                 <a:rPr lang="ko-KR" altLang="en-US" sz="1200" b="1" dirty="0" smtClean="0"/>
@@ -10464,11 +11386,6 @@
                 </a:rPr>
                 <a:t>Implementation</a:t>
               </a:r>
-              <a:endParaRPr lang="en-US" altLang="ko-KR" sz="1400" dirty="0" smtClean="0">
-                <a:solidFill>
-                  <a:schemeClr val="tx1"/>
-                </a:solidFill>
-              </a:endParaRPr>
             </a:p>
           </p:txBody>
         </p:sp>
@@ -11137,11 +12054,7 @@
               </a:r>
               <a:r>
                 <a:rPr lang="en-US" altLang="ko-KR" sz="1200" b="1" dirty="0" smtClean="0"/>
-                <a:t>Target </a:t>
-              </a:r>
-              <a:r>
-                <a:rPr lang="en-US" altLang="ko-KR" sz="1200" b="1" dirty="0" smtClean="0"/>
-                <a:t>Logic</a:t>
+                <a:t>Target Logic</a:t>
               </a:r>
               <a:r>
                 <a:rPr lang="ko-KR" altLang="en-US" sz="1200" b="1" dirty="0" smtClean="0"/>
@@ -11160,6 +12073,56 @@
           </p:txBody>
         </p:sp>
       </p:grpSp>
+      <p:sp>
+        <p:nvSpPr>
+          <p:cNvPr id="25" name="TextBox 24"/>
+          <p:cNvSpPr txBox="1"/>
+          <p:nvPr/>
+        </p:nvSpPr>
+        <p:spPr>
+          <a:xfrm>
+            <a:off x="438790" y="528598"/>
+            <a:ext cx="4300227" cy="400110"/>
+          </a:xfrm>
+          <a:prstGeom prst="rect">
+            <a:avLst/>
+          </a:prstGeom>
+          <a:noFill/>
+        </p:spPr>
+        <p:txBody>
+          <a:bodyPr wrap="square" rtlCol="0">
+            <a:spAutoFit/>
+          </a:bodyPr>
+          <a:lstStyle/>
+          <a:p>
+            <a:r>
+              <a:rPr lang="ko-KR" altLang="en-US" sz="1000" dirty="0" smtClean="0"/>
+              <a:t>상속받은 부모의 기능을 사용하지 않는다 </a:t>
+            </a:r>
+            <a:r>
+              <a:rPr lang="en-US" altLang="ko-KR" sz="1000" dirty="0" smtClean="0"/>
+              <a:t>(</a:t>
+            </a:r>
+            <a:r>
+              <a:rPr lang="ko-KR" altLang="en-US" sz="1000" dirty="0" smtClean="0"/>
+              <a:t>아래 그림처럼 </a:t>
+            </a:r>
+            <a:r>
+              <a:rPr lang="ko-KR" altLang="en-US" sz="1000" dirty="0" err="1" smtClean="0"/>
+              <a:t>생각할수</a:t>
+            </a:r>
+            <a:r>
+              <a:rPr lang="ko-KR" altLang="en-US" sz="1000" dirty="0" smtClean="0"/>
+              <a:t> 있으나 디자인패턴에서 이렇게 사용하지는 않는다</a:t>
+            </a:r>
+            <a:r>
+              <a:rPr lang="en-US" altLang="ko-KR" sz="1000" dirty="0" smtClean="0"/>
+              <a:t>)</a:t>
+            </a:r>
+            <a:endParaRPr lang="ko-KR" altLang="en-US" sz="1000" dirty="0"/>
+          </a:p>
+        </p:txBody>
+      </p:sp>
     </p:spTree>
     <p:extLst>
       <p:ext uri="{BB962C8B-B14F-4D97-AF65-F5344CB8AC3E}">
@@ -11198,8 +12161,8 @@
         </p:nvSpPr>
         <p:spPr>
           <a:xfrm>
-            <a:off x="274320" y="182880"/>
-            <a:ext cx="7922029" cy="338554"/>
+            <a:off x="182880" y="90062"/>
+            <a:ext cx="6126480" cy="307777"/>
           </a:xfrm>
           <a:prstGeom prst="rect">
             <a:avLst/>
@@ -11213,321 +12176,804 @@
           <a:lstStyle/>
           <a:p>
             <a:r>
-              <a:rPr lang="en-US" altLang="ko-KR" sz="1600" dirty="0" smtClean="0">
+              <a:rPr lang="en-US" altLang="ko-KR" sz="1400" dirty="0" smtClean="0">
                 <a:latin typeface="Times New Roman" panose="02020603050405020304" pitchFamily="18" charset="0"/>
                 <a:cs typeface="Times New Roman" panose="02020603050405020304" pitchFamily="18" charset="0"/>
               </a:rPr>
-              <a:t>Proxy Pattern (Runtime </a:t>
-            </a:r>
-            <a:r>
-              <a:rPr lang="ko-KR" altLang="en-US" sz="1600" dirty="0" smtClean="0">
+              <a:t>Proxy Pattern (</a:t>
+            </a:r>
+            <a:r>
+              <a:rPr lang="ko-KR" altLang="en-US" sz="1400" dirty="0" smtClean="0">
                 <a:latin typeface="Times New Roman" panose="02020603050405020304" pitchFamily="18" charset="0"/>
                 <a:cs typeface="Times New Roman" panose="02020603050405020304" pitchFamily="18" charset="0"/>
               </a:rPr>
-              <a:t>의존관계</a:t>
-            </a:r>
-            <a:r>
-              <a:rPr lang="en-US" altLang="ko-KR" sz="1600" dirty="0" smtClean="0">
+              <a:t>실제 </a:t>
+            </a:r>
+            <a:r>
+              <a:rPr lang="en-US" altLang="ko-KR" sz="1400" dirty="0" smtClean="0">
                 <a:latin typeface="Times New Roman" panose="02020603050405020304" pitchFamily="18" charset="0"/>
                 <a:cs typeface="Times New Roman" panose="02020603050405020304" pitchFamily="18" charset="0"/>
               </a:rPr>
-              <a:t>) – </a:t>
-            </a:r>
-            <a:r>
-              <a:rPr lang="ko-KR" altLang="en-US" sz="1600" dirty="0" smtClean="0">
+              <a:t>Runtime </a:t>
+            </a:r>
+            <a:r>
+              <a:rPr lang="ko-KR" altLang="en-US" sz="1400" dirty="0" err="1" smtClean="0">
                 <a:latin typeface="Times New Roman" panose="02020603050405020304" pitchFamily="18" charset="0"/>
                 <a:cs typeface="Times New Roman" panose="02020603050405020304" pitchFamily="18" charset="0"/>
               </a:rPr>
-              <a:t>결론적으로 얘기하자면 아래와 같다</a:t>
-            </a:r>
-            <a:r>
-              <a:rPr lang="en-US" altLang="ko-KR" sz="1600" dirty="0" smtClean="0">
+              <a:t>동적관계</a:t>
+            </a:r>
+            <a:r>
+              <a:rPr lang="en-US" altLang="ko-KR" sz="1400" dirty="0" smtClean="0">
                 <a:latin typeface="Times New Roman" panose="02020603050405020304" pitchFamily="18" charset="0"/>
                 <a:cs typeface="Times New Roman" panose="02020603050405020304" pitchFamily="18" charset="0"/>
               </a:rPr>
-              <a:t>.</a:t>
-            </a:r>
-            <a:endParaRPr lang="en-US" altLang="ko-KR" sz="1200" dirty="0" smtClean="0">
+              <a:t>) - </a:t>
+            </a:r>
+            <a:r>
+              <a:rPr lang="ko-KR" altLang="en-US" sz="1400" dirty="0">
+                <a:latin typeface="Times New Roman" panose="02020603050405020304" pitchFamily="18" charset="0"/>
+                <a:cs typeface="Times New Roman" panose="02020603050405020304" pitchFamily="18" charset="0"/>
+              </a:rPr>
+              <a:t>구체 클래스만 있는 곳</a:t>
+            </a:r>
+            <a:endParaRPr lang="en-US" altLang="ko-KR" sz="1100" dirty="0">
               <a:latin typeface="Times New Roman" panose="02020603050405020304" pitchFamily="18" charset="0"/>
               <a:cs typeface="Times New Roman" panose="02020603050405020304" pitchFamily="18" charset="0"/>
             </a:endParaRPr>
           </a:p>
         </p:txBody>
       </p:sp>
-      <p:grpSp>
-        <p:nvGrpSpPr>
-          <p:cNvPr id="5" name="그룹 4"/>
-          <p:cNvGrpSpPr/>
-          <p:nvPr/>
-        </p:nvGrpSpPr>
-        <p:grpSpPr>
-          <a:xfrm>
-            <a:off x="1130531" y="1130532"/>
-            <a:ext cx="9642764" cy="1213658"/>
-            <a:chOff x="1496291" y="1296786"/>
-            <a:chExt cx="9642764" cy="1213658"/>
-          </a:xfrm>
-        </p:grpSpPr>
-        <p:sp>
-          <p:nvSpPr>
-            <p:cNvPr id="3" name="모서리가 둥근 직사각형 2"/>
-            <p:cNvSpPr/>
-            <p:nvPr/>
-          </p:nvSpPr>
-          <p:spPr>
-            <a:xfrm>
-              <a:off x="1496291" y="1296786"/>
-              <a:ext cx="2576946" cy="1213658"/>
-            </a:xfrm>
-            <a:prstGeom prst="roundRect">
-              <a:avLst/>
-            </a:prstGeom>
-            <a:noFill/>
-            <a:ln>
-              <a:solidFill>
-                <a:schemeClr val="tx1"/>
-              </a:solidFill>
-            </a:ln>
-          </p:spPr>
-          <p:style>
-            <a:lnRef idx="2">
-              <a:schemeClr val="accent1">
-                <a:shade val="50000"/>
-              </a:schemeClr>
-            </a:lnRef>
-            <a:fillRef idx="1">
-              <a:schemeClr val="accent1"/>
-            </a:fillRef>
-            <a:effectRef idx="0">
-              <a:schemeClr val="accent1"/>
-            </a:effectRef>
-            <a:fontRef idx="minor">
-              <a:schemeClr val="lt1"/>
-            </a:fontRef>
-          </p:style>
-          <p:txBody>
-            <a:bodyPr rtlCol="0" anchor="ctr"/>
-            <a:lstStyle/>
-            <a:p>
-              <a:pPr algn="ctr"/>
-              <a:r>
-                <a:rPr lang="en-US" altLang="ko-KR" dirty="0" smtClean="0">
-                  <a:solidFill>
-                    <a:schemeClr val="tx1"/>
-                  </a:solidFill>
-                </a:rPr>
-                <a:t>Client</a:t>
-              </a:r>
-              <a:endParaRPr lang="ko-KR" altLang="en-US" dirty="0">
-                <a:solidFill>
-                  <a:schemeClr val="tx1"/>
-                </a:solidFill>
-              </a:endParaRPr>
-            </a:p>
-          </p:txBody>
-        </p:sp>
-        <p:sp>
-          <p:nvSpPr>
-            <p:cNvPr id="32" name="모서리가 둥근 직사각형 31"/>
-            <p:cNvSpPr/>
-            <p:nvPr/>
-          </p:nvSpPr>
-          <p:spPr>
-            <a:xfrm>
-              <a:off x="5029200" y="1296786"/>
-              <a:ext cx="2576946" cy="1213658"/>
-            </a:xfrm>
-            <a:prstGeom prst="roundRect">
-              <a:avLst/>
-            </a:prstGeom>
-            <a:noFill/>
-            <a:ln>
-              <a:solidFill>
-                <a:schemeClr val="tx1"/>
-              </a:solidFill>
-            </a:ln>
-          </p:spPr>
-          <p:style>
-            <a:lnRef idx="2">
-              <a:schemeClr val="accent1">
-                <a:shade val="50000"/>
-              </a:schemeClr>
-            </a:lnRef>
-            <a:fillRef idx="1">
-              <a:schemeClr val="accent1"/>
-            </a:fillRef>
-            <a:effectRef idx="0">
-              <a:schemeClr val="accent1"/>
-            </a:effectRef>
-            <a:fontRef idx="minor">
-              <a:schemeClr val="lt1"/>
-            </a:fontRef>
-          </p:style>
-          <p:txBody>
-            <a:bodyPr rtlCol="0" anchor="ctr"/>
-            <a:lstStyle/>
-            <a:p>
-              <a:pPr algn="ctr"/>
-              <a:r>
-                <a:rPr lang="en-US" altLang="ko-KR" dirty="0" smtClean="0">
-                  <a:solidFill>
-                    <a:schemeClr val="tx1"/>
-                  </a:solidFill>
-                </a:rPr>
-                <a:t>Proxy</a:t>
-              </a:r>
-              <a:endParaRPr lang="ko-KR" altLang="en-US" dirty="0">
-                <a:solidFill>
-                  <a:schemeClr val="tx1"/>
-                </a:solidFill>
-              </a:endParaRPr>
-            </a:p>
-          </p:txBody>
-        </p:sp>
-        <p:sp>
-          <p:nvSpPr>
-            <p:cNvPr id="34" name="모서리가 둥근 직사각형 33"/>
-            <p:cNvSpPr/>
-            <p:nvPr/>
-          </p:nvSpPr>
-          <p:spPr>
-            <a:xfrm>
-              <a:off x="8562109" y="1296786"/>
-              <a:ext cx="2576946" cy="1213658"/>
-            </a:xfrm>
-            <a:prstGeom prst="roundRect">
-              <a:avLst/>
-            </a:prstGeom>
-            <a:noFill/>
-            <a:ln>
-              <a:solidFill>
-                <a:schemeClr val="tx1"/>
-              </a:solidFill>
-            </a:ln>
-          </p:spPr>
-          <p:style>
-            <a:lnRef idx="2">
-              <a:schemeClr val="accent1">
-                <a:shade val="50000"/>
-              </a:schemeClr>
-            </a:lnRef>
-            <a:fillRef idx="1">
-              <a:schemeClr val="accent1"/>
-            </a:fillRef>
-            <a:effectRef idx="0">
-              <a:schemeClr val="accent1"/>
-            </a:effectRef>
-            <a:fontRef idx="minor">
-              <a:schemeClr val="lt1"/>
-            </a:fontRef>
-          </p:style>
-          <p:txBody>
-            <a:bodyPr rtlCol="0" anchor="ctr"/>
-            <a:lstStyle/>
-            <a:p>
-              <a:pPr algn="ctr"/>
-              <a:r>
-                <a:rPr lang="en-US" altLang="ko-KR" dirty="0" err="1">
-                  <a:solidFill>
-                    <a:schemeClr val="tx1"/>
-                  </a:solidFill>
-                </a:rPr>
-                <a:t>R</a:t>
-              </a:r>
-              <a:r>
-                <a:rPr lang="en-US" altLang="ko-KR" dirty="0" err="1" smtClean="0">
-                  <a:solidFill>
-                    <a:schemeClr val="tx1"/>
-                  </a:solidFill>
-                </a:rPr>
-                <a:t>ealSubject</a:t>
-              </a:r>
-              <a:endParaRPr lang="ko-KR" altLang="en-US" dirty="0">
-                <a:solidFill>
-                  <a:schemeClr val="tx1"/>
-                </a:solidFill>
-              </a:endParaRPr>
-            </a:p>
-          </p:txBody>
-        </p:sp>
-        <p:cxnSp>
-          <p:nvCxnSpPr>
-            <p:cNvPr id="14" name="직선 화살표 연결선 13"/>
-            <p:cNvCxnSpPr>
-              <a:stCxn id="3" idx="3"/>
-            </p:cNvCxnSpPr>
-            <p:nvPr/>
-          </p:nvCxnSpPr>
-          <p:spPr>
-            <a:xfrm>
-              <a:off x="4073237" y="1903615"/>
-              <a:ext cx="955963" cy="0"/>
-            </a:xfrm>
-            <a:prstGeom prst="straightConnector1">
-              <a:avLst/>
-            </a:prstGeom>
-            <a:ln>
-              <a:tailEnd type="triangle"/>
-            </a:ln>
-          </p:spPr>
-          <p:style>
-            <a:lnRef idx="1">
-              <a:schemeClr val="accent1"/>
-            </a:lnRef>
-            <a:fillRef idx="0">
-              <a:schemeClr val="accent1"/>
-            </a:fillRef>
-            <a:effectRef idx="0">
-              <a:schemeClr val="accent1"/>
-            </a:effectRef>
-            <a:fontRef idx="minor">
-              <a:schemeClr val="tx1"/>
-            </a:fontRef>
-          </p:style>
-        </p:cxnSp>
-        <p:cxnSp>
-          <p:nvCxnSpPr>
-            <p:cNvPr id="11" name="직선 화살표 연결선 10"/>
-            <p:cNvCxnSpPr/>
-            <p:nvPr/>
-          </p:nvCxnSpPr>
-          <p:spPr>
-            <a:xfrm>
-              <a:off x="7606146" y="1903615"/>
-              <a:ext cx="955963" cy="0"/>
-            </a:xfrm>
-            <a:prstGeom prst="straightConnector1">
-              <a:avLst/>
-            </a:prstGeom>
-            <a:ln>
-              <a:tailEnd type="triangle"/>
-            </a:ln>
-          </p:spPr>
-          <p:style>
-            <a:lnRef idx="1">
-              <a:schemeClr val="accent1"/>
-            </a:lnRef>
-            <a:fillRef idx="0">
-              <a:schemeClr val="accent1"/>
-            </a:fillRef>
-            <a:effectRef idx="0">
-              <a:schemeClr val="accent1"/>
-            </a:effectRef>
-            <a:fontRef idx="minor">
-              <a:schemeClr val="tx1"/>
-            </a:fontRef>
-          </p:style>
-        </p:cxnSp>
-      </p:grpSp>
       <p:sp>
         <p:nvSpPr>
-          <p:cNvPr id="13" name="직사각형 12"/>
+          <p:cNvPr id="30" name="직사각형 29"/>
           <p:cNvSpPr/>
           <p:nvPr/>
         </p:nvSpPr>
         <p:spPr>
           <a:xfrm>
-            <a:off x="3657407" y="1402075"/>
+            <a:off x="5203768" y="1890559"/>
+            <a:ext cx="2593571" cy="3840482"/>
+          </a:xfrm>
+          <a:prstGeom prst="rect">
+            <a:avLst/>
+          </a:prstGeom>
+          <a:gradFill flip="none" rotWithShape="1">
+            <a:gsLst>
+              <a:gs pos="0">
+                <a:schemeClr val="accent1">
+                  <a:tint val="66000"/>
+                  <a:satMod val="160000"/>
+                </a:schemeClr>
+              </a:gs>
+              <a:gs pos="50000">
+                <a:schemeClr val="accent1">
+                  <a:tint val="44500"/>
+                  <a:satMod val="160000"/>
+                </a:schemeClr>
+              </a:gs>
+              <a:gs pos="100000">
+                <a:schemeClr val="accent1">
+                  <a:tint val="23500"/>
+                  <a:satMod val="160000"/>
+                </a:schemeClr>
+              </a:gs>
+            </a:gsLst>
+            <a:lin ang="5400000" scaled="1"/>
+            <a:tileRect/>
+          </a:gradFill>
+          <a:ln>
+            <a:solidFill>
+              <a:schemeClr val="tx1"/>
+            </a:solidFill>
+          </a:ln>
+        </p:spPr>
+        <p:style>
+          <a:lnRef idx="2">
+            <a:schemeClr val="accent1">
+              <a:shade val="50000"/>
+            </a:schemeClr>
+          </a:lnRef>
+          <a:fillRef idx="1">
+            <a:schemeClr val="accent1"/>
+          </a:fillRef>
+          <a:effectRef idx="0">
+            <a:schemeClr val="accent1"/>
+          </a:effectRef>
+          <a:fontRef idx="minor">
+            <a:schemeClr val="lt1"/>
+          </a:fontRef>
+        </p:style>
+        <p:txBody>
+          <a:bodyPr rtlCol="0" anchor="ctr"/>
+          <a:lstStyle/>
+          <a:p>
+            <a:pPr algn="ctr"/>
+            <a:endParaRPr lang="ko-KR" altLang="en-US"/>
+          </a:p>
+        </p:txBody>
+      </p:sp>
+      <p:sp>
+        <p:nvSpPr>
+          <p:cNvPr id="3" name="모서리가 둥근 직사각형 2"/>
+          <p:cNvSpPr/>
+          <p:nvPr/>
+        </p:nvSpPr>
+        <p:spPr>
+          <a:xfrm>
+            <a:off x="590205" y="1890561"/>
+            <a:ext cx="2576946" cy="2261061"/>
+          </a:xfrm>
+          <a:prstGeom prst="roundRect">
+            <a:avLst/>
+          </a:prstGeom>
+          <a:noFill/>
+          <a:ln>
+            <a:solidFill>
+              <a:schemeClr val="tx1"/>
+            </a:solidFill>
+          </a:ln>
+        </p:spPr>
+        <p:style>
+          <a:lnRef idx="2">
+            <a:schemeClr val="accent1">
+              <a:shade val="50000"/>
+            </a:schemeClr>
+          </a:lnRef>
+          <a:fillRef idx="1">
+            <a:schemeClr val="accent1"/>
+          </a:fillRef>
+          <a:effectRef idx="0">
+            <a:schemeClr val="accent1"/>
+          </a:effectRef>
+          <a:fontRef idx="minor">
+            <a:schemeClr val="lt1"/>
+          </a:fontRef>
+        </p:style>
+        <p:txBody>
+          <a:bodyPr rtlCol="0" anchor="ctr"/>
+          <a:lstStyle/>
+          <a:p>
+            <a:pPr algn="ctr"/>
+            <a:endParaRPr lang="ko-KR" altLang="en-US" dirty="0">
+              <a:solidFill>
+                <a:schemeClr val="tx1"/>
+              </a:solidFill>
+            </a:endParaRPr>
+          </a:p>
+        </p:txBody>
+      </p:sp>
+      <p:sp>
+        <p:nvSpPr>
+          <p:cNvPr id="32" name="모서리가 둥근 직사각형 31"/>
+          <p:cNvSpPr/>
+          <p:nvPr/>
+        </p:nvSpPr>
+        <p:spPr>
+          <a:xfrm>
+            <a:off x="4857403" y="721489"/>
+            <a:ext cx="3230879" cy="5743340"/>
+          </a:xfrm>
+          <a:prstGeom prst="roundRect">
+            <a:avLst/>
+          </a:prstGeom>
+          <a:noFill/>
+          <a:ln>
+            <a:solidFill>
+              <a:schemeClr val="tx1"/>
+            </a:solidFill>
+          </a:ln>
+        </p:spPr>
+        <p:style>
+          <a:lnRef idx="2">
+            <a:schemeClr val="accent1">
+              <a:shade val="50000"/>
+            </a:schemeClr>
+          </a:lnRef>
+          <a:fillRef idx="1">
+            <a:schemeClr val="accent1"/>
+          </a:fillRef>
+          <a:effectRef idx="0">
+            <a:schemeClr val="accent1"/>
+          </a:effectRef>
+          <a:fontRef idx="minor">
+            <a:schemeClr val="lt1"/>
+          </a:fontRef>
+        </p:style>
+        <p:txBody>
+          <a:bodyPr rtlCol="0" anchor="ctr"/>
+          <a:lstStyle/>
+          <a:p>
+            <a:pPr algn="ctr"/>
+            <a:endParaRPr lang="ko-KR" altLang="en-US" dirty="0">
+              <a:solidFill>
+                <a:schemeClr val="tx1"/>
+              </a:solidFill>
+            </a:endParaRPr>
+          </a:p>
+        </p:txBody>
+      </p:sp>
+      <p:sp>
+        <p:nvSpPr>
+          <p:cNvPr id="34" name="모서리가 둥근 직사각형 33"/>
+          <p:cNvSpPr/>
+          <p:nvPr/>
+        </p:nvSpPr>
+        <p:spPr>
+          <a:xfrm>
+            <a:off x="8679869" y="1211686"/>
+            <a:ext cx="2576946" cy="3496890"/>
+          </a:xfrm>
+          <a:prstGeom prst="roundRect">
+            <a:avLst/>
+          </a:prstGeom>
+          <a:noFill/>
+          <a:ln>
+            <a:solidFill>
+              <a:schemeClr val="tx1"/>
+            </a:solidFill>
+          </a:ln>
+        </p:spPr>
+        <p:style>
+          <a:lnRef idx="2">
+            <a:schemeClr val="accent1">
+              <a:shade val="50000"/>
+            </a:schemeClr>
+          </a:lnRef>
+          <a:fillRef idx="1">
+            <a:schemeClr val="accent1"/>
+          </a:fillRef>
+          <a:effectRef idx="0">
+            <a:schemeClr val="accent1"/>
+          </a:effectRef>
+          <a:fontRef idx="minor">
+            <a:schemeClr val="lt1"/>
+          </a:fontRef>
+        </p:style>
+        <p:txBody>
+          <a:bodyPr rtlCol="0" anchor="ctr"/>
+          <a:lstStyle/>
+          <a:p>
+            <a:pPr algn="ctr"/>
+            <a:endParaRPr lang="ko-KR" altLang="en-US" dirty="0">
+              <a:solidFill>
+                <a:schemeClr val="tx1"/>
+              </a:solidFill>
+            </a:endParaRPr>
+          </a:p>
+        </p:txBody>
+      </p:sp>
+      <p:sp>
+        <p:nvSpPr>
+          <p:cNvPr id="37" name="모서리가 둥근 직사각형 36"/>
+          <p:cNvSpPr/>
+          <p:nvPr/>
+        </p:nvSpPr>
+        <p:spPr>
+          <a:xfrm>
+            <a:off x="854826" y="2656567"/>
+            <a:ext cx="2047703" cy="729047"/>
+          </a:xfrm>
+          <a:prstGeom prst="roundRect">
+            <a:avLst/>
+          </a:prstGeom>
+          <a:noFill/>
+          <a:ln>
+            <a:solidFill>
+              <a:schemeClr val="tx1"/>
+            </a:solidFill>
+          </a:ln>
+        </p:spPr>
+        <p:style>
+          <a:lnRef idx="2">
+            <a:schemeClr val="accent1">
+              <a:shade val="50000"/>
+            </a:schemeClr>
+          </a:lnRef>
+          <a:fillRef idx="1">
+            <a:schemeClr val="accent1"/>
+          </a:fillRef>
+          <a:effectRef idx="0">
+            <a:schemeClr val="accent1"/>
+          </a:effectRef>
+          <a:fontRef idx="minor">
+            <a:schemeClr val="lt1"/>
+          </a:fontRef>
+        </p:style>
+        <p:txBody>
+          <a:bodyPr rtlCol="0" anchor="ctr"/>
+          <a:lstStyle/>
+          <a:p>
+            <a:pPr algn="ctr"/>
+            <a:r>
+              <a:rPr lang="en-US" altLang="ko-KR" sz="1400" dirty="0">
+                <a:solidFill>
+                  <a:schemeClr val="tx1"/>
+                </a:solidFill>
+              </a:rPr>
+              <a:t>&lt;</a:t>
+            </a:r>
+            <a:r>
+              <a:rPr lang="en-US" altLang="ko-KR" sz="1400" dirty="0" smtClean="0">
+                <a:solidFill>
+                  <a:schemeClr val="tx1"/>
+                </a:solidFill>
+              </a:rPr>
+              <a:t>Implementation</a:t>
+            </a:r>
+            <a:r>
+              <a:rPr lang="en-US" altLang="ko-KR" sz="1400" dirty="0">
+                <a:solidFill>
+                  <a:schemeClr val="tx1"/>
+                </a:solidFill>
+              </a:rPr>
+              <a:t>&gt;</a:t>
+            </a:r>
+          </a:p>
+          <a:p>
+            <a:pPr algn="ctr"/>
+            <a:r>
+              <a:rPr lang="en-US" altLang="ko-KR" sz="1400" dirty="0">
+                <a:solidFill>
+                  <a:schemeClr val="tx1"/>
+                </a:solidFill>
+              </a:rPr>
+              <a:t>Subject</a:t>
+            </a:r>
+            <a:endParaRPr lang="ko-KR" altLang="en-US" sz="1400" dirty="0">
+              <a:solidFill>
+                <a:schemeClr val="tx1"/>
+              </a:solidFill>
+            </a:endParaRPr>
+          </a:p>
+        </p:txBody>
+      </p:sp>
+      <p:sp>
+        <p:nvSpPr>
+          <p:cNvPr id="20" name="직사각형 19"/>
+          <p:cNvSpPr/>
+          <p:nvPr/>
+        </p:nvSpPr>
+        <p:spPr>
+          <a:xfrm>
+            <a:off x="854827" y="1705893"/>
+            <a:ext cx="779380" cy="369332"/>
+          </a:xfrm>
+          <a:prstGeom prst="rect">
+            <a:avLst/>
+          </a:prstGeom>
+          <a:solidFill>
+            <a:schemeClr val="bg1"/>
+          </a:solidFill>
+          <a:ln>
+            <a:solidFill>
+              <a:schemeClr val="tx1"/>
+            </a:solidFill>
+          </a:ln>
+        </p:spPr>
+        <p:txBody>
+          <a:bodyPr wrap="none">
+            <a:spAutoFit/>
+          </a:bodyPr>
+          <a:lstStyle/>
+          <a:p>
+            <a:pPr algn="ctr"/>
+            <a:r>
+              <a:rPr lang="en-US" altLang="ko-KR" dirty="0"/>
+              <a:t>Client</a:t>
+            </a:r>
+            <a:endParaRPr lang="ko-KR" altLang="en-US" dirty="0"/>
+          </a:p>
+        </p:txBody>
+      </p:sp>
+      <p:sp>
+        <p:nvSpPr>
+          <p:cNvPr id="29" name="모서리가 둥근 직사각형 28"/>
+          <p:cNvSpPr/>
+          <p:nvPr/>
+        </p:nvSpPr>
+        <p:spPr>
+          <a:xfrm>
+            <a:off x="5448990" y="3364199"/>
+            <a:ext cx="2047703" cy="729047"/>
+          </a:xfrm>
+          <a:prstGeom prst="roundRect">
+            <a:avLst/>
+          </a:prstGeom>
+          <a:solidFill>
+            <a:schemeClr val="bg1"/>
+          </a:solidFill>
+          <a:ln>
+            <a:solidFill>
+              <a:schemeClr val="tx1"/>
+            </a:solidFill>
+          </a:ln>
+        </p:spPr>
+        <p:style>
+          <a:lnRef idx="2">
+            <a:schemeClr val="accent1">
+              <a:shade val="50000"/>
+            </a:schemeClr>
+          </a:lnRef>
+          <a:fillRef idx="1">
+            <a:schemeClr val="accent1"/>
+          </a:fillRef>
+          <a:effectRef idx="0">
+            <a:schemeClr val="accent1"/>
+          </a:effectRef>
+          <a:fontRef idx="minor">
+            <a:schemeClr val="lt1"/>
+          </a:fontRef>
+        </p:style>
+        <p:txBody>
+          <a:bodyPr rtlCol="0" anchor="ctr"/>
+          <a:lstStyle/>
+          <a:p>
+            <a:pPr algn="ctr"/>
+            <a:r>
+              <a:rPr lang="en-US" altLang="ko-KR" sz="1400" dirty="0" smtClean="0">
+                <a:solidFill>
+                  <a:schemeClr val="tx1"/>
+                </a:solidFill>
+              </a:rPr>
+              <a:t>&lt;Implementation&gt;</a:t>
+            </a:r>
+            <a:endParaRPr lang="en-US" altLang="ko-KR" sz="1400" dirty="0" smtClean="0">
+              <a:solidFill>
+                <a:schemeClr val="tx1"/>
+              </a:solidFill>
+            </a:endParaRPr>
+          </a:p>
+          <a:p>
+            <a:pPr algn="ctr"/>
+            <a:r>
+              <a:rPr lang="en-US" altLang="ko-KR" sz="1400" dirty="0" smtClean="0">
+                <a:solidFill>
+                  <a:schemeClr val="tx1"/>
+                </a:solidFill>
+              </a:rPr>
+              <a:t>Subject</a:t>
+            </a:r>
+            <a:endParaRPr lang="ko-KR" altLang="en-US" sz="1400" dirty="0">
+              <a:solidFill>
+                <a:schemeClr val="tx1"/>
+              </a:solidFill>
+            </a:endParaRPr>
+          </a:p>
+        </p:txBody>
+      </p:sp>
+      <p:sp>
+        <p:nvSpPr>
+          <p:cNvPr id="21" name="TextBox 20"/>
+          <p:cNvSpPr txBox="1"/>
+          <p:nvPr/>
+        </p:nvSpPr>
+        <p:spPr>
+          <a:xfrm>
+            <a:off x="5511339" y="3060934"/>
+            <a:ext cx="1320336" cy="276999"/>
+          </a:xfrm>
+          <a:prstGeom prst="rect">
+            <a:avLst/>
+          </a:prstGeom>
+          <a:noFill/>
+        </p:spPr>
+        <p:txBody>
+          <a:bodyPr wrap="square" rtlCol="0">
+            <a:spAutoFit/>
+          </a:bodyPr>
+          <a:lstStyle/>
+          <a:p>
+            <a:r>
+              <a:rPr lang="en-US" altLang="ko-KR" sz="1200" dirty="0" smtClean="0">
+                <a:solidFill>
+                  <a:srgbClr val="FF0000"/>
+                </a:solidFill>
+              </a:rPr>
+              <a:t>Injection (target)</a:t>
+            </a:r>
+            <a:endParaRPr lang="ko-KR" altLang="en-US" sz="1200" dirty="0">
+              <a:solidFill>
+                <a:srgbClr val="FF0000"/>
+              </a:solidFill>
+            </a:endParaRPr>
+          </a:p>
+        </p:txBody>
+      </p:sp>
+      <p:sp>
+        <p:nvSpPr>
+          <p:cNvPr id="31" name="TextBox 30"/>
+          <p:cNvSpPr txBox="1"/>
+          <p:nvPr/>
+        </p:nvSpPr>
+        <p:spPr>
+          <a:xfrm>
+            <a:off x="854826" y="2379568"/>
+            <a:ext cx="822960" cy="276999"/>
+          </a:xfrm>
+          <a:prstGeom prst="rect">
+            <a:avLst/>
+          </a:prstGeom>
+          <a:noFill/>
+        </p:spPr>
+        <p:txBody>
+          <a:bodyPr wrap="square" rtlCol="0">
+            <a:spAutoFit/>
+          </a:bodyPr>
+          <a:lstStyle/>
+          <a:p>
+            <a:r>
+              <a:rPr lang="en-US" altLang="ko-KR" sz="1200" dirty="0" smtClean="0">
+                <a:solidFill>
+                  <a:srgbClr val="FF0000"/>
+                </a:solidFill>
+              </a:rPr>
+              <a:t>Injection</a:t>
+            </a:r>
+            <a:endParaRPr lang="ko-KR" altLang="en-US" sz="1200" dirty="0">
+              <a:solidFill>
+                <a:srgbClr val="FF0000"/>
+              </a:solidFill>
+            </a:endParaRPr>
+          </a:p>
+        </p:txBody>
+      </p:sp>
+      <p:sp>
+        <p:nvSpPr>
+          <p:cNvPr id="22" name="직사각형 21"/>
+          <p:cNvSpPr/>
+          <p:nvPr/>
+        </p:nvSpPr>
+        <p:spPr>
+          <a:xfrm>
+            <a:off x="9012155" y="966062"/>
+            <a:ext cx="1383136" cy="369332"/>
+          </a:xfrm>
+          <a:prstGeom prst="rect">
+            <a:avLst/>
+          </a:prstGeom>
+          <a:solidFill>
+            <a:schemeClr val="bg1"/>
+          </a:solidFill>
+          <a:ln>
+            <a:solidFill>
+              <a:schemeClr val="tx1"/>
+            </a:solidFill>
+          </a:ln>
+        </p:spPr>
+        <p:txBody>
+          <a:bodyPr wrap="none">
+            <a:spAutoFit/>
+          </a:bodyPr>
+          <a:lstStyle/>
+          <a:p>
+            <a:pPr algn="ctr"/>
+            <a:r>
+              <a:rPr lang="en-US" altLang="ko-KR" dirty="0" err="1"/>
+              <a:t>RealSubject</a:t>
+            </a:r>
+            <a:endParaRPr lang="ko-KR" altLang="en-US" dirty="0"/>
+          </a:p>
+        </p:txBody>
+      </p:sp>
+      <p:sp>
+        <p:nvSpPr>
+          <p:cNvPr id="45" name="TextBox 44"/>
+          <p:cNvSpPr txBox="1"/>
+          <p:nvPr/>
+        </p:nvSpPr>
+        <p:spPr>
+          <a:xfrm>
+            <a:off x="5426651" y="2146597"/>
+            <a:ext cx="2123905" cy="246221"/>
+          </a:xfrm>
+          <a:prstGeom prst="rect">
+            <a:avLst/>
+          </a:prstGeom>
+          <a:noFill/>
+        </p:spPr>
+        <p:txBody>
+          <a:bodyPr wrap="square" rtlCol="0">
+            <a:spAutoFit/>
+          </a:bodyPr>
+          <a:lstStyle/>
+          <a:p>
+            <a:r>
+              <a:rPr lang="en-US" altLang="ko-KR" sz="1000" b="1" dirty="0" smtClean="0"/>
+              <a:t>Proxy </a:t>
+            </a:r>
+            <a:r>
+              <a:rPr lang="ko-KR" altLang="en-US" sz="1000" b="1" dirty="0" smtClean="0"/>
+              <a:t>부가기능 등의 </a:t>
+            </a:r>
+            <a:r>
+              <a:rPr lang="ko-KR" altLang="en-US" sz="1000" b="1" dirty="0" err="1" smtClean="0"/>
+              <a:t>로직을</a:t>
+            </a:r>
+            <a:r>
+              <a:rPr lang="ko-KR" altLang="en-US" sz="1000" b="1" dirty="0" smtClean="0"/>
+              <a:t> 구현</a:t>
+            </a:r>
+            <a:endParaRPr lang="ko-KR" altLang="en-US" sz="1000" b="1" dirty="0"/>
+          </a:p>
+        </p:txBody>
+      </p:sp>
+      <p:sp>
+        <p:nvSpPr>
+          <p:cNvPr id="47" name="TextBox 46"/>
+          <p:cNvSpPr txBox="1"/>
+          <p:nvPr/>
+        </p:nvSpPr>
+        <p:spPr>
+          <a:xfrm>
+            <a:off x="5511339" y="5783024"/>
+            <a:ext cx="2061554" cy="461665"/>
+          </a:xfrm>
+          <a:prstGeom prst="rect">
+            <a:avLst/>
+          </a:prstGeom>
+          <a:noFill/>
+        </p:spPr>
+        <p:txBody>
+          <a:bodyPr wrap="square" rtlCol="0">
+            <a:spAutoFit/>
+          </a:bodyPr>
+          <a:lstStyle/>
+          <a:p>
+            <a:pPr algn="ctr"/>
+            <a:r>
+              <a:rPr lang="ko-KR" altLang="en-US" sz="1200" b="1" dirty="0" smtClean="0"/>
+              <a:t>주입된 </a:t>
+            </a:r>
+            <a:r>
+              <a:rPr lang="en-US" altLang="ko-KR" sz="1200" b="1" dirty="0" smtClean="0"/>
+              <a:t>Target Logic</a:t>
+            </a:r>
+            <a:r>
+              <a:rPr lang="ko-KR" altLang="en-US" sz="1200" b="1" dirty="0" smtClean="0"/>
+              <a:t>을 감싸서 </a:t>
+            </a:r>
+            <a:r>
+              <a:rPr lang="en-US" altLang="ko-KR" sz="1200" b="1" dirty="0" smtClean="0"/>
+              <a:t>Proxy</a:t>
+            </a:r>
+            <a:r>
+              <a:rPr lang="ko-KR" altLang="en-US" sz="1200" b="1" dirty="0" smtClean="0"/>
+              <a:t>기능을 추가</a:t>
+            </a:r>
+            <a:endParaRPr lang="ko-KR" altLang="en-US" sz="1200" b="1" dirty="0"/>
+          </a:p>
+        </p:txBody>
+      </p:sp>
+      <p:cxnSp>
+        <p:nvCxnSpPr>
+          <p:cNvPr id="27" name="꺾인 연결선 26"/>
+          <p:cNvCxnSpPr>
+            <a:stCxn id="3" idx="3"/>
+            <a:endCxn id="32" idx="1"/>
+          </p:cNvCxnSpPr>
+          <p:nvPr/>
+        </p:nvCxnSpPr>
+        <p:spPr>
+          <a:xfrm>
+            <a:off x="3167151" y="3021092"/>
+            <a:ext cx="1690252" cy="572067"/>
+          </a:xfrm>
+          <a:prstGeom prst="bentConnector3">
+            <a:avLst>
+              <a:gd name="adj1" fmla="val 50000"/>
+            </a:avLst>
+          </a:prstGeom>
+          <a:ln>
+            <a:tailEnd type="triangle"/>
+          </a:ln>
+        </p:spPr>
+        <p:style>
+          <a:lnRef idx="1">
+            <a:schemeClr val="dk1"/>
+          </a:lnRef>
+          <a:fillRef idx="0">
+            <a:schemeClr val="dk1"/>
+          </a:fillRef>
+          <a:effectRef idx="0">
+            <a:schemeClr val="dk1"/>
+          </a:effectRef>
+          <a:fontRef idx="minor">
+            <a:schemeClr val="tx1"/>
+          </a:fontRef>
+        </p:style>
+      </p:cxnSp>
+      <p:sp>
+        <p:nvSpPr>
+          <p:cNvPr id="36" name="직사각형 35"/>
+          <p:cNvSpPr/>
+          <p:nvPr/>
+        </p:nvSpPr>
+        <p:spPr>
+          <a:xfrm>
+            <a:off x="1160400" y="3440981"/>
+            <a:ext cx="1436553" cy="276999"/>
+          </a:xfrm>
+          <a:prstGeom prst="rect">
+            <a:avLst/>
+          </a:prstGeom>
+          <a:solidFill>
+            <a:schemeClr val="bg1"/>
+          </a:solidFill>
+          <a:ln>
+            <a:noFill/>
+          </a:ln>
+        </p:spPr>
+        <p:txBody>
+          <a:bodyPr wrap="square">
+            <a:spAutoFit/>
+          </a:bodyPr>
+          <a:lstStyle/>
+          <a:p>
+            <a:pPr algn="ctr"/>
+            <a:r>
+              <a:rPr lang="en-US" altLang="ko-KR" sz="1200" dirty="0" smtClean="0"/>
+              <a:t>Proxy (</a:t>
+            </a:r>
+            <a:r>
+              <a:rPr lang="ko-KR" altLang="en-US" sz="1200" dirty="0" smtClean="0"/>
+              <a:t>객체 주입</a:t>
+            </a:r>
+            <a:r>
+              <a:rPr lang="en-US" altLang="ko-KR" sz="1200" dirty="0" smtClean="0"/>
+              <a:t>)</a:t>
+            </a:r>
+            <a:endParaRPr lang="ko-KR" altLang="en-US" sz="1200" dirty="0"/>
+          </a:p>
+        </p:txBody>
+      </p:sp>
+      <p:cxnSp>
+        <p:nvCxnSpPr>
+          <p:cNvPr id="38" name="꺾인 연결선 37"/>
+          <p:cNvCxnSpPr>
+            <a:stCxn id="29" idx="3"/>
+            <a:endCxn id="44" idx="1"/>
+          </p:cNvCxnSpPr>
+          <p:nvPr/>
+        </p:nvCxnSpPr>
+        <p:spPr>
+          <a:xfrm flipV="1">
+            <a:off x="7496693" y="2329348"/>
+            <a:ext cx="1536473" cy="1399375"/>
+          </a:xfrm>
+          <a:prstGeom prst="bentConnector3">
+            <a:avLst>
+              <a:gd name="adj1" fmla="val 50000"/>
+            </a:avLst>
+          </a:prstGeom>
+          <a:ln>
+            <a:tailEnd type="triangle"/>
+          </a:ln>
+        </p:spPr>
+        <p:style>
+          <a:lnRef idx="1">
+            <a:schemeClr val="dk1"/>
+          </a:lnRef>
+          <a:fillRef idx="0">
+            <a:schemeClr val="dk1"/>
+          </a:fillRef>
+          <a:effectRef idx="0">
+            <a:schemeClr val="dk1"/>
+          </a:effectRef>
+          <a:fontRef idx="minor">
+            <a:schemeClr val="tx1"/>
+          </a:fontRef>
+        </p:style>
+      </p:cxnSp>
+      <p:sp>
+        <p:nvSpPr>
+          <p:cNvPr id="39" name="직사각형 38"/>
+          <p:cNvSpPr/>
+          <p:nvPr/>
+        </p:nvSpPr>
+        <p:spPr>
+          <a:xfrm>
+            <a:off x="7607139" y="3462145"/>
             <a:ext cx="1072730" cy="276999"/>
           </a:xfrm>
           <a:prstGeom prst="rect">
@@ -11550,489 +12996,69 @@
       </p:sp>
       <p:sp>
         <p:nvSpPr>
-          <p:cNvPr id="15" name="직사각형 14"/>
+          <p:cNvPr id="41" name="직사각형 40"/>
           <p:cNvSpPr/>
           <p:nvPr/>
         </p:nvSpPr>
         <p:spPr>
           <a:xfrm>
-            <a:off x="7182002" y="1402074"/>
-            <a:ext cx="1072730" cy="276999"/>
+            <a:off x="5782276" y="4145229"/>
+            <a:ext cx="1436553" cy="461665"/>
           </a:xfrm>
           <a:prstGeom prst="rect">
             <a:avLst/>
           </a:prstGeom>
+          <a:solidFill>
+            <a:schemeClr val="bg1"/>
+          </a:solidFill>
+          <a:ln>
+            <a:noFill/>
+          </a:ln>
         </p:spPr>
         <p:txBody>
-          <a:bodyPr wrap="none">
+          <a:bodyPr wrap="square">
             <a:spAutoFit/>
           </a:bodyPr>
           <a:lstStyle/>
           <a:p>
-            <a:r>
-              <a:rPr lang="en-US" altLang="ko-KR" sz="1200" b="1" dirty="0"/>
-              <a:t>operations()</a:t>
-            </a:r>
-            <a:endParaRPr lang="ko-KR" altLang="en-US" sz="1200" b="1" dirty="0"/>
+            <a:pPr algn="ctr"/>
+            <a:r>
+              <a:rPr lang="en-US" altLang="ko-KR" sz="1200" dirty="0" err="1" smtClean="0"/>
+              <a:t>RealSubject</a:t>
+            </a:r>
+            <a:r>
+              <a:rPr lang="en-US" altLang="ko-KR" sz="1200" dirty="0" smtClean="0"/>
+              <a:t> </a:t>
+            </a:r>
+          </a:p>
+          <a:p>
+            <a:pPr algn="ctr"/>
+            <a:r>
+              <a:rPr lang="en-US" altLang="ko-KR" sz="1200" dirty="0" smtClean="0"/>
+              <a:t>(</a:t>
+            </a:r>
+            <a:r>
+              <a:rPr lang="ko-KR" altLang="en-US" sz="1200" dirty="0" smtClean="0"/>
+              <a:t>객체 주입</a:t>
+            </a:r>
+            <a:r>
+              <a:rPr lang="en-US" altLang="ko-KR" sz="1200" dirty="0" smtClean="0"/>
+              <a:t>)</a:t>
+            </a:r>
+            <a:endParaRPr lang="ko-KR" altLang="en-US" sz="1200" dirty="0"/>
           </a:p>
         </p:txBody>
       </p:sp>
       <p:sp>
         <p:nvSpPr>
-          <p:cNvPr id="23" name="직사각형 22"/>
-          <p:cNvSpPr/>
-          <p:nvPr/>
-        </p:nvSpPr>
-        <p:spPr>
-          <a:xfrm>
-            <a:off x="3261167" y="4678727"/>
-            <a:ext cx="1072730" cy="276999"/>
-          </a:xfrm>
-          <a:prstGeom prst="rect">
-            <a:avLst/>
-          </a:prstGeom>
-        </p:spPr>
-        <p:txBody>
-          <a:bodyPr wrap="none">
-            <a:spAutoFit/>
-          </a:bodyPr>
-          <a:lstStyle/>
-          <a:p>
-            <a:r>
-              <a:rPr lang="en-US" altLang="ko-KR" sz="1200" b="1" dirty="0"/>
-              <a:t>operations()</a:t>
-            </a:r>
-            <a:endParaRPr lang="ko-KR" altLang="en-US" sz="1200" b="1" dirty="0"/>
-          </a:p>
-        </p:txBody>
-      </p:sp>
-      <p:sp>
-        <p:nvSpPr>
-          <p:cNvPr id="24" name="직사각형 23"/>
-          <p:cNvSpPr/>
-          <p:nvPr/>
-        </p:nvSpPr>
-        <p:spPr>
-          <a:xfrm>
-            <a:off x="5630987" y="5055525"/>
-            <a:ext cx="1072730" cy="276999"/>
-          </a:xfrm>
-          <a:prstGeom prst="rect">
-            <a:avLst/>
-          </a:prstGeom>
-        </p:spPr>
-        <p:txBody>
-          <a:bodyPr wrap="none">
-            <a:spAutoFit/>
-          </a:bodyPr>
-          <a:lstStyle/>
-          <a:p>
-            <a:r>
-              <a:rPr lang="en-US" altLang="ko-KR" sz="1200" b="1" dirty="0"/>
-              <a:t>operations()</a:t>
-            </a:r>
-            <a:endParaRPr lang="ko-KR" altLang="en-US" sz="1200" b="1" dirty="0"/>
-          </a:p>
-        </p:txBody>
-      </p:sp>
-      <p:grpSp>
-        <p:nvGrpSpPr>
-          <p:cNvPr id="8" name="그룹 7"/>
-          <p:cNvGrpSpPr/>
-          <p:nvPr/>
-        </p:nvGrpSpPr>
-        <p:grpSpPr>
-          <a:xfrm>
-            <a:off x="742604" y="3973488"/>
-            <a:ext cx="10870277" cy="1216426"/>
-            <a:chOff x="742604" y="3973488"/>
-            <a:chExt cx="10870277" cy="1216426"/>
-          </a:xfrm>
-        </p:grpSpPr>
-        <p:sp>
-          <p:nvSpPr>
-            <p:cNvPr id="17" name="모서리가 둥근 직사각형 16"/>
-            <p:cNvSpPr/>
-            <p:nvPr/>
-          </p:nvSpPr>
-          <p:spPr>
-            <a:xfrm>
-              <a:off x="742604" y="3976256"/>
-              <a:ext cx="2576946" cy="1213658"/>
-            </a:xfrm>
-            <a:prstGeom prst="roundRect">
-              <a:avLst/>
-            </a:prstGeom>
-            <a:noFill/>
-            <a:ln>
-              <a:solidFill>
-                <a:schemeClr val="tx1"/>
-              </a:solidFill>
-            </a:ln>
-          </p:spPr>
-          <p:style>
-            <a:lnRef idx="2">
-              <a:schemeClr val="accent1">
-                <a:shade val="50000"/>
-              </a:schemeClr>
-            </a:lnRef>
-            <a:fillRef idx="1">
-              <a:schemeClr val="accent1"/>
-            </a:fillRef>
-            <a:effectRef idx="0">
-              <a:schemeClr val="accent1"/>
-            </a:effectRef>
-            <a:fontRef idx="minor">
-              <a:schemeClr val="lt1"/>
-            </a:fontRef>
-          </p:style>
-          <p:txBody>
-            <a:bodyPr rtlCol="0" anchor="ctr"/>
-            <a:lstStyle/>
-            <a:p>
-              <a:pPr algn="ctr"/>
-              <a:r>
-                <a:rPr lang="en-US" altLang="ko-KR" dirty="0" smtClean="0">
-                  <a:solidFill>
-                    <a:schemeClr val="tx1"/>
-                  </a:solidFill>
-                </a:rPr>
-                <a:t>Client</a:t>
-              </a:r>
-              <a:endParaRPr lang="ko-KR" altLang="en-US" dirty="0">
-                <a:solidFill>
-                  <a:schemeClr val="tx1"/>
-                </a:solidFill>
-              </a:endParaRPr>
-            </a:p>
-          </p:txBody>
-        </p:sp>
-        <p:sp>
-          <p:nvSpPr>
-            <p:cNvPr id="19" name="모서리가 둥근 직사각형 18"/>
-            <p:cNvSpPr/>
-            <p:nvPr/>
-          </p:nvSpPr>
-          <p:spPr>
-            <a:xfrm>
-              <a:off x="4275513" y="4114802"/>
-              <a:ext cx="1620983" cy="936566"/>
-            </a:xfrm>
-            <a:prstGeom prst="roundRect">
-              <a:avLst/>
-            </a:prstGeom>
-            <a:noFill/>
-            <a:ln>
-              <a:solidFill>
-                <a:schemeClr val="tx1"/>
-              </a:solidFill>
-            </a:ln>
-          </p:spPr>
-          <p:style>
-            <a:lnRef idx="2">
-              <a:schemeClr val="accent1">
-                <a:shade val="50000"/>
-              </a:schemeClr>
-            </a:lnRef>
-            <a:fillRef idx="1">
-              <a:schemeClr val="accent1"/>
-            </a:fillRef>
-            <a:effectRef idx="0">
-              <a:schemeClr val="accent1"/>
-            </a:effectRef>
-            <a:fontRef idx="minor">
-              <a:schemeClr val="lt1"/>
-            </a:fontRef>
-          </p:style>
-          <p:txBody>
-            <a:bodyPr rtlCol="0" anchor="ctr"/>
-            <a:lstStyle/>
-            <a:p>
-              <a:pPr algn="ctr"/>
-              <a:r>
-                <a:rPr lang="en-US" altLang="ko-KR" dirty="0" smtClean="0">
-                  <a:solidFill>
-                    <a:schemeClr val="tx1"/>
-                  </a:solidFill>
-                </a:rPr>
-                <a:t>Proxy</a:t>
-              </a:r>
-              <a:endParaRPr lang="ko-KR" altLang="en-US" dirty="0">
-                <a:solidFill>
-                  <a:schemeClr val="tx1"/>
-                </a:solidFill>
-              </a:endParaRPr>
-            </a:p>
-          </p:txBody>
-        </p:sp>
-        <p:sp>
-          <p:nvSpPr>
-            <p:cNvPr id="20" name="모서리가 둥근 직사각형 19"/>
-            <p:cNvSpPr/>
-            <p:nvPr/>
-          </p:nvSpPr>
-          <p:spPr>
-            <a:xfrm>
-              <a:off x="9035935" y="3973488"/>
-              <a:ext cx="2576946" cy="1213658"/>
-            </a:xfrm>
-            <a:prstGeom prst="roundRect">
-              <a:avLst/>
-            </a:prstGeom>
-            <a:noFill/>
-            <a:ln>
-              <a:solidFill>
-                <a:schemeClr val="tx1"/>
-              </a:solidFill>
-            </a:ln>
-          </p:spPr>
-          <p:style>
-            <a:lnRef idx="2">
-              <a:schemeClr val="accent1">
-                <a:shade val="50000"/>
-              </a:schemeClr>
-            </a:lnRef>
-            <a:fillRef idx="1">
-              <a:schemeClr val="accent1"/>
-            </a:fillRef>
-            <a:effectRef idx="0">
-              <a:schemeClr val="accent1"/>
-            </a:effectRef>
-            <a:fontRef idx="minor">
-              <a:schemeClr val="lt1"/>
-            </a:fontRef>
-          </p:style>
-          <p:txBody>
-            <a:bodyPr rtlCol="0" anchor="ctr"/>
-            <a:lstStyle/>
-            <a:p>
-              <a:pPr algn="ctr"/>
-              <a:r>
-                <a:rPr lang="en-US" altLang="ko-KR" dirty="0" err="1">
-                  <a:solidFill>
-                    <a:schemeClr val="tx1"/>
-                  </a:solidFill>
-                </a:rPr>
-                <a:t>R</a:t>
-              </a:r>
-              <a:r>
-                <a:rPr lang="en-US" altLang="ko-KR" dirty="0" err="1" smtClean="0">
-                  <a:solidFill>
-                    <a:schemeClr val="tx1"/>
-                  </a:solidFill>
-                </a:rPr>
-                <a:t>ealSubject</a:t>
-              </a:r>
-              <a:endParaRPr lang="ko-KR" altLang="en-US" dirty="0">
-                <a:solidFill>
-                  <a:schemeClr val="tx1"/>
-                </a:solidFill>
-              </a:endParaRPr>
-            </a:p>
-          </p:txBody>
-        </p:sp>
-        <p:cxnSp>
-          <p:nvCxnSpPr>
-            <p:cNvPr id="21" name="직선 화살표 연결선 20"/>
-            <p:cNvCxnSpPr>
-              <a:stCxn id="17" idx="3"/>
-            </p:cNvCxnSpPr>
-            <p:nvPr/>
-          </p:nvCxnSpPr>
-          <p:spPr>
-            <a:xfrm>
-              <a:off x="3319550" y="4583085"/>
-              <a:ext cx="955963" cy="0"/>
-            </a:xfrm>
-            <a:prstGeom prst="straightConnector1">
-              <a:avLst/>
-            </a:prstGeom>
-            <a:ln>
-              <a:tailEnd type="triangle"/>
-            </a:ln>
-          </p:spPr>
-          <p:style>
-            <a:lnRef idx="1">
-              <a:schemeClr val="accent1"/>
-            </a:lnRef>
-            <a:fillRef idx="0">
-              <a:schemeClr val="accent1"/>
-            </a:fillRef>
-            <a:effectRef idx="0">
-              <a:schemeClr val="accent1"/>
-            </a:effectRef>
-            <a:fontRef idx="minor">
-              <a:schemeClr val="tx1"/>
-            </a:fontRef>
-          </p:style>
-        </p:cxnSp>
-        <p:cxnSp>
-          <p:nvCxnSpPr>
-            <p:cNvPr id="22" name="직선 화살표 연결선 21"/>
-            <p:cNvCxnSpPr/>
-            <p:nvPr/>
-          </p:nvCxnSpPr>
-          <p:spPr>
-            <a:xfrm>
-              <a:off x="8079972" y="4580317"/>
-              <a:ext cx="955963" cy="0"/>
-            </a:xfrm>
-            <a:prstGeom prst="straightConnector1">
-              <a:avLst/>
-            </a:prstGeom>
-            <a:ln>
-              <a:tailEnd type="triangle"/>
-            </a:ln>
-          </p:spPr>
-          <p:style>
-            <a:lnRef idx="1">
-              <a:schemeClr val="accent1"/>
-            </a:lnRef>
-            <a:fillRef idx="0">
-              <a:schemeClr val="accent1"/>
-            </a:fillRef>
-            <a:effectRef idx="0">
-              <a:schemeClr val="accent1"/>
-            </a:effectRef>
-            <a:fontRef idx="minor">
-              <a:schemeClr val="tx1"/>
-            </a:fontRef>
-          </p:style>
-        </p:cxnSp>
-        <p:sp>
-          <p:nvSpPr>
-            <p:cNvPr id="25" name="모서리가 둥근 직사각형 24"/>
-            <p:cNvSpPr/>
-            <p:nvPr/>
-          </p:nvSpPr>
-          <p:spPr>
-            <a:xfrm>
-              <a:off x="6438208" y="4112034"/>
-              <a:ext cx="1620983" cy="936566"/>
-            </a:xfrm>
-            <a:prstGeom prst="roundRect">
-              <a:avLst/>
-            </a:prstGeom>
-            <a:noFill/>
-            <a:ln>
-              <a:solidFill>
-                <a:schemeClr val="tx1"/>
-              </a:solidFill>
-            </a:ln>
-          </p:spPr>
-          <p:style>
-            <a:lnRef idx="2">
-              <a:schemeClr val="accent1">
-                <a:shade val="50000"/>
-              </a:schemeClr>
-            </a:lnRef>
-            <a:fillRef idx="1">
-              <a:schemeClr val="accent1"/>
-            </a:fillRef>
-            <a:effectRef idx="0">
-              <a:schemeClr val="accent1"/>
-            </a:effectRef>
-            <a:fontRef idx="minor">
-              <a:schemeClr val="lt1"/>
-            </a:fontRef>
-          </p:style>
-          <p:txBody>
-            <a:bodyPr rtlCol="0" anchor="ctr"/>
-            <a:lstStyle/>
-            <a:p>
-              <a:pPr algn="ctr"/>
-              <a:r>
-                <a:rPr lang="en-US" altLang="ko-KR" dirty="0" smtClean="0">
-                  <a:solidFill>
-                    <a:schemeClr val="tx1"/>
-                  </a:solidFill>
-                </a:rPr>
-                <a:t>Proxy</a:t>
-              </a:r>
-              <a:endParaRPr lang="ko-KR" altLang="en-US" dirty="0">
-                <a:solidFill>
-                  <a:schemeClr val="tx1"/>
-                </a:solidFill>
-              </a:endParaRPr>
-            </a:p>
-          </p:txBody>
-        </p:sp>
-        <p:cxnSp>
-          <p:nvCxnSpPr>
-            <p:cNvPr id="26" name="직선 화살표 연결선 25"/>
-            <p:cNvCxnSpPr>
-              <a:stCxn id="19" idx="3"/>
-              <a:endCxn id="25" idx="1"/>
-            </p:cNvCxnSpPr>
-            <p:nvPr/>
-          </p:nvCxnSpPr>
-          <p:spPr>
-            <a:xfrm flipV="1">
-              <a:off x="5896496" y="4580317"/>
-              <a:ext cx="541712" cy="2768"/>
-            </a:xfrm>
-            <a:prstGeom prst="straightConnector1">
-              <a:avLst/>
-            </a:prstGeom>
-            <a:ln>
-              <a:tailEnd type="triangle"/>
-            </a:ln>
-          </p:spPr>
-          <p:style>
-            <a:lnRef idx="1">
-              <a:schemeClr val="accent1"/>
-            </a:lnRef>
-            <a:fillRef idx="0">
-              <a:schemeClr val="accent1"/>
-            </a:fillRef>
-            <a:effectRef idx="0">
-              <a:schemeClr val="accent1"/>
-            </a:effectRef>
-            <a:fontRef idx="minor">
-              <a:schemeClr val="tx1"/>
-            </a:fontRef>
-          </p:style>
-        </p:cxnSp>
-      </p:grpSp>
-      <p:sp>
-        <p:nvSpPr>
-          <p:cNvPr id="28" name="직사각형 27"/>
-          <p:cNvSpPr/>
-          <p:nvPr/>
-        </p:nvSpPr>
-        <p:spPr>
-          <a:xfrm>
-            <a:off x="8021589" y="4644881"/>
-            <a:ext cx="1072730" cy="276999"/>
-          </a:xfrm>
-          <a:prstGeom prst="rect">
-            <a:avLst/>
-          </a:prstGeom>
-        </p:spPr>
-        <p:txBody>
-          <a:bodyPr wrap="none">
-            <a:spAutoFit/>
-          </a:bodyPr>
-          <a:lstStyle/>
-          <a:p>
-            <a:r>
-              <a:rPr lang="en-US" altLang="ko-KR" sz="1200" b="1" dirty="0"/>
-              <a:t>operations()</a:t>
-            </a:r>
-            <a:endParaRPr lang="ko-KR" altLang="en-US" sz="1200" b="1" dirty="0"/>
-          </a:p>
-        </p:txBody>
-      </p:sp>
-      <p:sp>
-        <p:nvSpPr>
-          <p:cNvPr id="9" name="TextBox 8"/>
+          <p:cNvPr id="16" name="TextBox 15"/>
           <p:cNvSpPr txBox="1"/>
           <p:nvPr/>
         </p:nvSpPr>
         <p:spPr>
           <a:xfrm>
-            <a:off x="985750" y="5804964"/>
-            <a:ext cx="5623561" cy="276999"/>
+            <a:off x="8352109" y="5352137"/>
+            <a:ext cx="2492436" cy="430887"/>
           </a:xfrm>
           <a:prstGeom prst="rect">
             <a:avLst/>
@@ -12046,49 +13072,455 @@
           <a:lstStyle/>
           <a:p>
             <a:r>
+              <a:rPr lang="ko-KR" altLang="en-US" sz="1100" b="1" dirty="0" smtClean="0"/>
+              <a:t>위의 패턴으로 </a:t>
+            </a:r>
+            <a:r>
+              <a:rPr lang="ko-KR" altLang="en-US" sz="1100" b="1" smtClean="0"/>
+              <a:t>색칠한 부분에서 </a:t>
+            </a:r>
+            <a:r>
+              <a:rPr lang="ko-KR" altLang="en-US" sz="1100" b="1" dirty="0" smtClean="0"/>
+              <a:t>새로운 </a:t>
+            </a:r>
+            <a:r>
+              <a:rPr lang="en-US" altLang="ko-KR" sz="1100" b="1" dirty="0" smtClean="0"/>
+              <a:t>Proxy</a:t>
+            </a:r>
+            <a:r>
+              <a:rPr lang="ko-KR" altLang="en-US" sz="1100" b="1" dirty="0" smtClean="0"/>
+              <a:t>기능을 </a:t>
+            </a:r>
+            <a:r>
+              <a:rPr lang="ko-KR" altLang="en-US" sz="1100" b="1" dirty="0" err="1" smtClean="0"/>
+              <a:t>추가할수</a:t>
+            </a:r>
+            <a:r>
+              <a:rPr lang="ko-KR" altLang="en-US" sz="1100" b="1" dirty="0" smtClean="0"/>
+              <a:t> 있다</a:t>
+            </a:r>
+            <a:r>
+              <a:rPr lang="en-US" altLang="ko-KR" sz="1100" b="1" dirty="0" smtClean="0"/>
+              <a:t>.</a:t>
+            </a:r>
+            <a:endParaRPr lang="ko-KR" altLang="en-US" sz="1100" b="1" dirty="0"/>
+          </a:p>
+        </p:txBody>
+      </p:sp>
+      <p:sp>
+        <p:nvSpPr>
+          <p:cNvPr id="17" name="TextBox 16"/>
+          <p:cNvSpPr txBox="1"/>
+          <p:nvPr/>
+        </p:nvSpPr>
+        <p:spPr>
+          <a:xfrm>
+            <a:off x="106389" y="6280163"/>
+            <a:ext cx="4814746" cy="461665"/>
+          </a:xfrm>
+          <a:prstGeom prst="rect">
+            <a:avLst/>
+          </a:prstGeom>
+          <a:noFill/>
+        </p:spPr>
+        <p:txBody>
+          <a:bodyPr wrap="square" rtlCol="0">
+            <a:spAutoFit/>
+          </a:bodyPr>
+          <a:lstStyle/>
+          <a:p>
+            <a:r>
+              <a:rPr lang="ko-KR" altLang="en-US" sz="1200" dirty="0" smtClean="0"/>
+              <a:t>상속받은 기능을 직접 사용하지 않고 </a:t>
+            </a:r>
+            <a:r>
+              <a:rPr lang="ko-KR" altLang="en-US" sz="1200" dirty="0" err="1" smtClean="0"/>
+              <a:t>다형성을</a:t>
+            </a:r>
+            <a:r>
+              <a:rPr lang="ko-KR" altLang="en-US" sz="1200" dirty="0" smtClean="0"/>
+              <a:t> 이용하기 위해서만 상속받는다</a:t>
+            </a:r>
+            <a:r>
               <a:rPr lang="en-US" altLang="ko-KR" sz="1200" dirty="0" smtClean="0"/>
-              <a:t>Client, Target</a:t>
+              <a:t>. </a:t>
             </a:r>
             <a:r>
               <a:rPr lang="ko-KR" altLang="en-US" sz="1200" dirty="0" smtClean="0"/>
-              <a:t>은 전혀 건들지않고 </a:t>
+              <a:t>실제 </a:t>
             </a:r>
             <a:r>
               <a:rPr lang="en-US" altLang="ko-KR" sz="1200" dirty="0" smtClean="0"/>
-              <a:t>Proxy</a:t>
+              <a:t>target</a:t>
             </a:r>
             <a:r>
               <a:rPr lang="ko-KR" altLang="en-US" sz="1200" dirty="0" smtClean="0"/>
-              <a:t>만 </a:t>
+              <a:t>은 </a:t>
             </a:r>
             <a:r>
               <a:rPr lang="en-US" altLang="ko-KR" sz="1200" dirty="0" smtClean="0"/>
-              <a:t>chain</a:t>
+              <a:t>Injection</a:t>
             </a:r>
             <a:r>
               <a:rPr lang="ko-KR" altLang="en-US" sz="1200" dirty="0" smtClean="0"/>
-              <a:t>으로 계속 넣어서 </a:t>
-            </a:r>
-            <a:r>
-              <a:rPr lang="ko-KR" altLang="en-US" sz="1200" dirty="0" err="1" smtClean="0"/>
-              <a:t>꾸밀수</a:t>
+              <a:t>받아서 사용한다 </a:t>
+            </a:r>
+            <a:r>
+              <a:rPr lang="en-US" altLang="ko-KR" sz="1200" dirty="0" smtClean="0"/>
+              <a:t>(</a:t>
             </a:r>
             <a:r>
               <a:rPr lang="ko-KR" altLang="en-US" sz="1200" dirty="0" smtClean="0"/>
-              <a:t> 있다</a:t>
+              <a:t>패턴을 맞춘다</a:t>
             </a:r>
             <a:r>
               <a:rPr lang="en-US" altLang="ko-KR" sz="1200" dirty="0" smtClean="0"/>
-              <a:t>.</a:t>
+              <a:t>)</a:t>
             </a:r>
             <a:endParaRPr lang="ko-KR" altLang="en-US" sz="1200" dirty="0"/>
+          </a:p>
+        </p:txBody>
+      </p:sp>
+      <p:sp>
+        <p:nvSpPr>
+          <p:cNvPr id="4" name="TextBox 3"/>
+          <p:cNvSpPr txBox="1"/>
+          <p:nvPr/>
+        </p:nvSpPr>
+        <p:spPr>
+          <a:xfrm>
+            <a:off x="349135" y="521434"/>
+            <a:ext cx="4006734" cy="261610"/>
+          </a:xfrm>
+          <a:prstGeom prst="rect">
+            <a:avLst/>
+          </a:prstGeom>
+          <a:noFill/>
+        </p:spPr>
+        <p:txBody>
+          <a:bodyPr wrap="square" rtlCol="0">
+            <a:spAutoFit/>
+          </a:bodyPr>
+          <a:lstStyle/>
+          <a:p>
+            <a:r>
+              <a:rPr lang="ko-KR" altLang="en-US" sz="1100" dirty="0" smtClean="0"/>
+              <a:t>인터페이스기반의 패턴과 똑같이 구현체 클래스도 만든다</a:t>
+            </a:r>
+            <a:endParaRPr lang="ko-KR" altLang="en-US" sz="1100" dirty="0"/>
+          </a:p>
+        </p:txBody>
+      </p:sp>
+      <p:sp>
+        <p:nvSpPr>
+          <p:cNvPr id="40" name="직사각형 39"/>
+          <p:cNvSpPr/>
+          <p:nvPr/>
+        </p:nvSpPr>
+        <p:spPr>
+          <a:xfrm>
+            <a:off x="5246715" y="552045"/>
+            <a:ext cx="2452254" cy="307777"/>
+          </a:xfrm>
+          <a:prstGeom prst="rect">
+            <a:avLst/>
+          </a:prstGeom>
+          <a:solidFill>
+            <a:schemeClr val="bg1"/>
+          </a:solidFill>
+          <a:ln>
+            <a:solidFill>
+              <a:schemeClr val="tx1"/>
+            </a:solidFill>
+          </a:ln>
+        </p:spPr>
+        <p:txBody>
+          <a:bodyPr wrap="square">
+            <a:spAutoFit/>
+          </a:bodyPr>
+          <a:lstStyle/>
+          <a:p>
+            <a:pPr algn="ctr"/>
+            <a:r>
+              <a:rPr lang="en-US" altLang="ko-KR" sz="1400" dirty="0" smtClean="0"/>
+              <a:t>Proxy </a:t>
+            </a:r>
+            <a:r>
+              <a:rPr lang="en-US" altLang="ko-KR" sz="1400" dirty="0" smtClean="0">
+                <a:solidFill>
+                  <a:schemeClr val="accent5"/>
+                </a:solidFill>
+              </a:rPr>
+              <a:t>extends</a:t>
+            </a:r>
+            <a:r>
+              <a:rPr lang="en-US" altLang="ko-KR" sz="1400" dirty="0" smtClean="0"/>
+              <a:t> </a:t>
+            </a:r>
+            <a:r>
+              <a:rPr lang="en-US" altLang="ko-KR" sz="1400" dirty="0" err="1" smtClean="0"/>
+              <a:t>RealSubject</a:t>
+            </a:r>
+            <a:endParaRPr lang="ko-KR" altLang="en-US" sz="1400" dirty="0"/>
+          </a:p>
+        </p:txBody>
+      </p:sp>
+      <p:sp>
+        <p:nvSpPr>
+          <p:cNvPr id="42" name="TextBox 41"/>
+          <p:cNvSpPr txBox="1"/>
+          <p:nvPr/>
+        </p:nvSpPr>
+        <p:spPr>
+          <a:xfrm>
+            <a:off x="9091426" y="2539361"/>
+            <a:ext cx="1066798" cy="276999"/>
+          </a:xfrm>
+          <a:prstGeom prst="rect">
+            <a:avLst/>
+          </a:prstGeom>
+          <a:noFill/>
+        </p:spPr>
+        <p:txBody>
+          <a:bodyPr wrap="square" rtlCol="0">
+            <a:spAutoFit/>
+          </a:bodyPr>
+          <a:lstStyle/>
+          <a:p>
+            <a:r>
+              <a:rPr lang="en-US" altLang="ko-KR" sz="1200" b="1" dirty="0" smtClean="0"/>
+              <a:t>operations()</a:t>
+            </a:r>
+            <a:endParaRPr lang="ko-KR" altLang="en-US" sz="1200" b="1" dirty="0">
+              <a:solidFill>
+                <a:srgbClr val="FF0000"/>
+              </a:solidFill>
+            </a:endParaRPr>
+          </a:p>
+        </p:txBody>
+      </p:sp>
+      <p:sp>
+        <p:nvSpPr>
+          <p:cNvPr id="46" name="TextBox 45"/>
+          <p:cNvSpPr txBox="1"/>
+          <p:nvPr/>
+        </p:nvSpPr>
+        <p:spPr>
+          <a:xfrm>
+            <a:off x="9224652" y="2922434"/>
+            <a:ext cx="1727665" cy="276999"/>
+          </a:xfrm>
+          <a:prstGeom prst="rect">
+            <a:avLst/>
+          </a:prstGeom>
+          <a:noFill/>
+        </p:spPr>
+        <p:txBody>
+          <a:bodyPr wrap="square" rtlCol="0">
+            <a:spAutoFit/>
+          </a:bodyPr>
+          <a:lstStyle/>
+          <a:p>
+            <a:pPr algn="ctr"/>
+            <a:r>
+              <a:rPr lang="ko-KR" altLang="en-US" sz="1200" b="1" smtClean="0"/>
+              <a:t>구현되어 있는 </a:t>
+            </a:r>
+            <a:r>
+              <a:rPr lang="ko-KR" altLang="en-US" sz="1200" b="1" dirty="0" err="1" smtClean="0"/>
+              <a:t>로직</a:t>
+            </a:r>
+            <a:endParaRPr lang="ko-KR" altLang="en-US" sz="1200" b="1" dirty="0"/>
+          </a:p>
+        </p:txBody>
+      </p:sp>
+      <p:sp>
+        <p:nvSpPr>
+          <p:cNvPr id="49" name="TextBox 48"/>
+          <p:cNvSpPr txBox="1"/>
+          <p:nvPr/>
+        </p:nvSpPr>
+        <p:spPr>
+          <a:xfrm>
+            <a:off x="3273087" y="2425734"/>
+            <a:ext cx="1347545" cy="461665"/>
+          </a:xfrm>
+          <a:prstGeom prst="rect">
+            <a:avLst/>
+          </a:prstGeom>
+          <a:noFill/>
+        </p:spPr>
+        <p:txBody>
+          <a:bodyPr wrap="square" rtlCol="0">
+            <a:spAutoFit/>
+          </a:bodyPr>
+          <a:lstStyle/>
+          <a:p>
+            <a:pPr algn="ctr"/>
+            <a:r>
+              <a:rPr lang="en-US" altLang="ko-KR" sz="1200" b="1" dirty="0" smtClean="0"/>
+              <a:t>Dependency Injection</a:t>
+            </a:r>
+            <a:endParaRPr lang="ko-KR" altLang="en-US" sz="1200" b="1" dirty="0"/>
+          </a:p>
+        </p:txBody>
+      </p:sp>
+      <p:sp>
+        <p:nvSpPr>
+          <p:cNvPr id="50" name="TextBox 49"/>
+          <p:cNvSpPr txBox="1"/>
+          <p:nvPr/>
+        </p:nvSpPr>
+        <p:spPr>
+          <a:xfrm>
+            <a:off x="4921135" y="1068627"/>
+            <a:ext cx="3167147" cy="646331"/>
+          </a:xfrm>
+          <a:prstGeom prst="rect">
+            <a:avLst/>
+          </a:prstGeom>
+          <a:noFill/>
+        </p:spPr>
+        <p:txBody>
+          <a:bodyPr wrap="square" rtlCol="0">
+            <a:spAutoFit/>
+          </a:bodyPr>
+          <a:lstStyle/>
+          <a:p>
+            <a:r>
+              <a:rPr lang="en-US" altLang="ko-KR" sz="1200" b="1" dirty="0" smtClean="0"/>
+              <a:t>* Proxy</a:t>
+            </a:r>
+            <a:r>
+              <a:rPr lang="ko-KR" altLang="en-US" sz="1200" b="1" dirty="0" smtClean="0"/>
+              <a:t>객체는 </a:t>
+            </a:r>
+            <a:r>
+              <a:rPr lang="en-US" altLang="ko-KR" sz="1200" b="1" dirty="0" err="1" smtClean="0"/>
+              <a:t>RealSubject</a:t>
+            </a:r>
+            <a:r>
+              <a:rPr lang="ko-KR" altLang="en-US" sz="1200" b="1" dirty="0" smtClean="0"/>
+              <a:t>를 상속받아 </a:t>
+            </a:r>
+            <a:r>
+              <a:rPr lang="ko-KR" altLang="en-US" sz="1200" b="1" dirty="0" err="1" smtClean="0"/>
+              <a:t>부모객체가</a:t>
+            </a:r>
+            <a:r>
+              <a:rPr lang="ko-KR" altLang="en-US" sz="1200" b="1" dirty="0" smtClean="0"/>
+              <a:t> </a:t>
+            </a:r>
+            <a:r>
+              <a:rPr lang="en-US" altLang="ko-KR" sz="1200" b="1" dirty="0" err="1" smtClean="0"/>
+              <a:t>RealSubject</a:t>
+            </a:r>
+            <a:r>
+              <a:rPr lang="ko-KR" altLang="en-US" sz="1200" b="1" dirty="0" smtClean="0"/>
+              <a:t>가 됨으로써 </a:t>
+            </a:r>
+            <a:r>
+              <a:rPr lang="en-US" altLang="ko-KR" sz="1200" b="1" dirty="0" smtClean="0"/>
+              <a:t>Client</a:t>
+            </a:r>
+            <a:r>
+              <a:rPr lang="ko-KR" altLang="en-US" sz="1200" b="1" dirty="0" smtClean="0"/>
+              <a:t>에 </a:t>
+            </a:r>
+            <a:r>
+              <a:rPr lang="ko-KR" altLang="en-US" sz="1200" b="1" dirty="0" err="1" smtClean="0"/>
+              <a:t>주입할수</a:t>
+            </a:r>
+            <a:r>
+              <a:rPr lang="ko-KR" altLang="en-US" sz="1200" b="1" dirty="0" smtClean="0"/>
+              <a:t> 있게 된다 </a:t>
+            </a:r>
+            <a:r>
+              <a:rPr lang="en-US" altLang="ko-KR" sz="1200" b="1" dirty="0" smtClean="0"/>
+              <a:t>(</a:t>
+            </a:r>
+            <a:r>
+              <a:rPr lang="ko-KR" altLang="en-US" sz="1200" b="1" dirty="0" err="1" smtClean="0"/>
+              <a:t>다형성</a:t>
+            </a:r>
+            <a:r>
+              <a:rPr lang="ko-KR" altLang="en-US" sz="1200" b="1" dirty="0" smtClean="0"/>
+              <a:t> 이용</a:t>
+            </a:r>
+            <a:r>
+              <a:rPr lang="en-US" altLang="ko-KR" sz="1200" b="1" dirty="0" smtClean="0"/>
+              <a:t>)</a:t>
+            </a:r>
+            <a:endParaRPr lang="ko-KR" altLang="en-US" sz="1200" b="1" dirty="0"/>
+          </a:p>
+        </p:txBody>
+      </p:sp>
+      <p:sp>
+        <p:nvSpPr>
+          <p:cNvPr id="51" name="TextBox 50"/>
+          <p:cNvSpPr txBox="1"/>
+          <p:nvPr/>
+        </p:nvSpPr>
+        <p:spPr>
+          <a:xfrm>
+            <a:off x="5447157" y="2444801"/>
+            <a:ext cx="1953793" cy="338554"/>
+          </a:xfrm>
+          <a:prstGeom prst="rect">
+            <a:avLst/>
+          </a:prstGeom>
+          <a:noFill/>
+        </p:spPr>
+        <p:txBody>
+          <a:bodyPr wrap="square" rtlCol="0">
+            <a:spAutoFit/>
+          </a:bodyPr>
+          <a:lstStyle/>
+          <a:p>
+            <a:pPr algn="ctr"/>
+            <a:r>
+              <a:rPr lang="en-US" altLang="ko-KR" sz="1600" dirty="0" smtClean="0"/>
+              <a:t>Logging start</a:t>
+            </a:r>
+            <a:endParaRPr lang="ko-KR" altLang="en-US" sz="1600" dirty="0"/>
+          </a:p>
+        </p:txBody>
+      </p:sp>
+      <p:sp>
+        <p:nvSpPr>
+          <p:cNvPr id="52" name="TextBox 51"/>
+          <p:cNvSpPr txBox="1"/>
+          <p:nvPr/>
+        </p:nvSpPr>
+        <p:spPr>
+          <a:xfrm>
+            <a:off x="5447157" y="4930544"/>
+            <a:ext cx="1953793" cy="338554"/>
+          </a:xfrm>
+          <a:prstGeom prst="rect">
+            <a:avLst/>
+          </a:prstGeom>
+          <a:noFill/>
+        </p:spPr>
+        <p:txBody>
+          <a:bodyPr wrap="square" rtlCol="0">
+            <a:spAutoFit/>
+          </a:bodyPr>
+          <a:lstStyle/>
+          <a:p>
+            <a:pPr algn="ctr"/>
+            <a:r>
+              <a:rPr lang="en-US" altLang="ko-KR" sz="1600" dirty="0" smtClean="0"/>
+              <a:t>Logging end</a:t>
+            </a:r>
+            <a:endParaRPr lang="ko-KR" altLang="en-US" sz="1600" dirty="0"/>
           </a:p>
         </p:txBody>
       </p:sp>
     </p:spTree>
     <p:extLst>
       <p:ext uri="{BB962C8B-B14F-4D97-AF65-F5344CB8AC3E}">
-        <p14:creationId xmlns:p14="http://schemas.microsoft.com/office/powerpoint/2010/main" val="1288125639"/>
+        <p14:creationId xmlns:p14="http://schemas.microsoft.com/office/powerpoint/2010/main" val="2303163188"/>
       </p:ext>
     </p:extLst>
   </p:cSld>

</xml_diff>